<commit_message>
Initial Draft for Demo
</commit_message>
<xml_diff>
--- a/2013-09/hadoop-map-reduce/MapReduce.pptx
+++ b/2013-09/hadoop-map-reduce/MapReduce.pptx
@@ -7,7 +7,25 @@
   <p:sldIdLst>
     <p:sldId id="256" r:id="rId2"/>
     <p:sldId id="257" r:id="rId3"/>
-    <p:sldId id="258" r:id="rId4"/>
+    <p:sldId id="260" r:id="rId4"/>
+    <p:sldId id="261" r:id="rId5"/>
+    <p:sldId id="262" r:id="rId6"/>
+    <p:sldId id="263" r:id="rId7"/>
+    <p:sldId id="264" r:id="rId8"/>
+    <p:sldId id="265" r:id="rId9"/>
+    <p:sldId id="267" r:id="rId10"/>
+    <p:sldId id="266" r:id="rId11"/>
+    <p:sldId id="268" r:id="rId12"/>
+    <p:sldId id="258" r:id="rId13"/>
+    <p:sldId id="269" r:id="rId14"/>
+    <p:sldId id="270" r:id="rId15"/>
+    <p:sldId id="271" r:id="rId16"/>
+    <p:sldId id="273" r:id="rId17"/>
+    <p:sldId id="274" r:id="rId18"/>
+    <p:sldId id="272" r:id="rId19"/>
+    <p:sldId id="275" r:id="rId20"/>
+    <p:sldId id="276" r:id="rId21"/>
+    <p:sldId id="259" r:id="rId22"/>
   </p:sldIdLst>
   <p:sldSz cx="12192000" cy="6858000"/>
   <p:notesSz cx="6858000" cy="9144000"/>
@@ -106,6 +124,11 @@
       </a:defRPr>
     </a:lvl9pPr>
   </p:defaultTextStyle>
+  <p:extLst>
+    <p:ext uri="{EFAFB233-063F-42B5-8137-9DF3F51BA10A}">
+      <p15:sldGuideLst xmlns:p15="http://schemas.microsoft.com/office/powerpoint/2012/main"/>
+    </p:ext>
+  </p:extLst>
 </p:presentation>
 </file>
 
@@ -5852,6 +5875,1039 @@
 </p:sld>
 </file>
 
+<file path=ppt/slides/slide10.xml><?xml version="1.0" encoding="utf-8"?>
+<p:sld xmlns:a="http://schemas.openxmlformats.org/drawingml/2006/main" xmlns:r="http://schemas.openxmlformats.org/officeDocument/2006/relationships" xmlns:p="http://schemas.openxmlformats.org/presentationml/2006/main">
+  <p:cSld>
+    <p:spTree>
+      <p:nvGrpSpPr>
+        <p:cNvPr id="1" name=""/>
+        <p:cNvGrpSpPr/>
+        <p:nvPr/>
+      </p:nvGrpSpPr>
+      <p:grpSpPr>
+        <a:xfrm>
+          <a:off x="0" y="0"/>
+          <a:ext cx="0" cy="0"/>
+          <a:chOff x="0" y="0"/>
+          <a:chExt cx="0" cy="0"/>
+        </a:xfrm>
+      </p:grpSpPr>
+      <p:sp>
+        <p:nvSpPr>
+          <p:cNvPr id="2" name="Title 1"/>
+          <p:cNvSpPr>
+            <a:spLocks noGrp="1"/>
+          </p:cNvSpPr>
+          <p:nvPr>
+            <p:ph type="title"/>
+          </p:nvPr>
+        </p:nvSpPr>
+        <p:spPr/>
+        <p:txBody>
+          <a:bodyPr/>
+          <a:lstStyle/>
+          <a:p>
+            <a:r>
+              <a:rPr lang="en-US" dirty="0" smtClean="0"/>
+              <a:t>Dataflow – Output Writer</a:t>
+            </a:r>
+            <a:endParaRPr lang="en-US" dirty="0"/>
+          </a:p>
+        </p:txBody>
+      </p:sp>
+      <p:sp>
+        <p:nvSpPr>
+          <p:cNvPr id="3" name="Content Placeholder 2"/>
+          <p:cNvSpPr>
+            <a:spLocks noGrp="1"/>
+          </p:cNvSpPr>
+          <p:nvPr>
+            <p:ph idx="1"/>
+          </p:nvPr>
+        </p:nvSpPr>
+        <p:spPr/>
+        <p:txBody>
+          <a:bodyPr/>
+          <a:lstStyle/>
+          <a:p>
+            <a:r>
+              <a:rPr lang="en-US" dirty="0" smtClean="0"/>
+              <a:t>Generates the Reducer Output into the right format</a:t>
+            </a:r>
+          </a:p>
+          <a:p>
+            <a:pPr lvl="1"/>
+            <a:r>
+              <a:rPr lang="en-US" dirty="0" smtClean="0"/>
+              <a:t>Text or Binary?</a:t>
+            </a:r>
+          </a:p>
+          <a:p>
+            <a:pPr lvl="1"/>
+            <a:r>
+              <a:rPr lang="en-US" dirty="0" smtClean="0"/>
+              <a:t>Compressed or Plain?</a:t>
+            </a:r>
+          </a:p>
+          <a:p>
+            <a:pPr lvl="1"/>
+            <a:r>
+              <a:rPr lang="en-US" dirty="0" smtClean="0"/>
+              <a:t>UTF-8 or ASCII?</a:t>
+            </a:r>
+          </a:p>
+          <a:p>
+            <a:pPr lvl="1"/>
+            <a:r>
+              <a:rPr lang="en-US" dirty="0" smtClean="0"/>
+              <a:t>CSV or JSON?</a:t>
+            </a:r>
+          </a:p>
+          <a:p>
+            <a:endParaRPr lang="en-US" dirty="0"/>
+          </a:p>
+          <a:p>
+            <a:r>
+              <a:rPr lang="en-US" dirty="0" smtClean="0"/>
+              <a:t>Output can potentially be the Input for a chained </a:t>
+            </a:r>
+            <a:r>
+              <a:rPr lang="en-US" dirty="0" err="1" smtClean="0"/>
+              <a:t>MapReduce</a:t>
+            </a:r>
+            <a:r>
+              <a:rPr lang="en-US" dirty="0" smtClean="0"/>
+              <a:t> Job</a:t>
+            </a:r>
+            <a:endParaRPr lang="en-US" dirty="0"/>
+          </a:p>
+        </p:txBody>
+      </p:sp>
+    </p:spTree>
+    <p:extLst>
+      <p:ext uri="{BB962C8B-B14F-4D97-AF65-F5344CB8AC3E}">
+        <p14:creationId xmlns:p14="http://schemas.microsoft.com/office/powerpoint/2010/main" val="3870474728"/>
+      </p:ext>
+    </p:extLst>
+  </p:cSld>
+  <p:clrMapOvr>
+    <a:masterClrMapping/>
+  </p:clrMapOvr>
+</p:sld>
+</file>
+
+<file path=ppt/slides/slide11.xml><?xml version="1.0" encoding="utf-8"?>
+<p:sld xmlns:a="http://schemas.openxmlformats.org/drawingml/2006/main" xmlns:r="http://schemas.openxmlformats.org/officeDocument/2006/relationships" xmlns:p="http://schemas.openxmlformats.org/presentationml/2006/main">
+  <p:cSld>
+    <p:spTree>
+      <p:nvGrpSpPr>
+        <p:cNvPr id="1" name=""/>
+        <p:cNvGrpSpPr/>
+        <p:nvPr/>
+      </p:nvGrpSpPr>
+      <p:grpSpPr>
+        <a:xfrm>
+          <a:off x="0" y="0"/>
+          <a:ext cx="0" cy="0"/>
+          <a:chOff x="0" y="0"/>
+          <a:chExt cx="0" cy="0"/>
+        </a:xfrm>
+      </p:grpSpPr>
+      <p:sp>
+        <p:nvSpPr>
+          <p:cNvPr id="2" name="Title 1"/>
+          <p:cNvSpPr>
+            <a:spLocks noGrp="1"/>
+          </p:cNvSpPr>
+          <p:nvPr>
+            <p:ph type="title"/>
+          </p:nvPr>
+        </p:nvSpPr>
+        <p:spPr/>
+        <p:txBody>
+          <a:bodyPr/>
+          <a:lstStyle/>
+          <a:p>
+            <a:r>
+              <a:rPr lang="en-US" dirty="0" err="1" smtClean="0"/>
+              <a:t>MapReduce</a:t>
+            </a:r>
+            <a:r>
+              <a:rPr lang="en-US" dirty="0" smtClean="0"/>
+              <a:t> Dataflow - Review</a:t>
+            </a:r>
+            <a:endParaRPr lang="en-US" dirty="0"/>
+          </a:p>
+        </p:txBody>
+      </p:sp>
+      <p:sp>
+        <p:nvSpPr>
+          <p:cNvPr id="3" name="Content Placeholder 2"/>
+          <p:cNvSpPr>
+            <a:spLocks noGrp="1"/>
+          </p:cNvSpPr>
+          <p:nvPr>
+            <p:ph idx="1"/>
+          </p:nvPr>
+        </p:nvSpPr>
+        <p:spPr/>
+        <p:txBody>
+          <a:bodyPr/>
+          <a:lstStyle/>
+          <a:p>
+            <a:r>
+              <a:rPr lang="en-US" dirty="0" smtClean="0"/>
+              <a:t>Input Reader and Input Splits</a:t>
+            </a:r>
+          </a:p>
+          <a:p>
+            <a:r>
+              <a:rPr lang="en-US" dirty="0" smtClean="0"/>
+              <a:t>Map</a:t>
+            </a:r>
+          </a:p>
+          <a:p>
+            <a:r>
+              <a:rPr lang="en-US" dirty="0" smtClean="0"/>
+              <a:t>Combine</a:t>
+            </a:r>
+          </a:p>
+          <a:p>
+            <a:r>
+              <a:rPr lang="en-US" dirty="0" smtClean="0"/>
+              <a:t>Sort</a:t>
+            </a:r>
+          </a:p>
+          <a:p>
+            <a:r>
+              <a:rPr lang="en-US" dirty="0" smtClean="0"/>
+              <a:t>Reduce</a:t>
+            </a:r>
+          </a:p>
+          <a:p>
+            <a:r>
+              <a:rPr lang="en-US" dirty="0" smtClean="0"/>
+              <a:t>Output Writer</a:t>
+            </a:r>
+          </a:p>
+          <a:p>
+            <a:endParaRPr lang="en-US" dirty="0"/>
+          </a:p>
+          <a:p>
+            <a:r>
+              <a:rPr lang="en-US" dirty="0" smtClean="0"/>
+              <a:t>Keep in mind that this is Distributed!</a:t>
+            </a:r>
+          </a:p>
+        </p:txBody>
+      </p:sp>
+    </p:spTree>
+    <p:extLst>
+      <p:ext uri="{BB962C8B-B14F-4D97-AF65-F5344CB8AC3E}">
+        <p14:creationId xmlns:p14="http://schemas.microsoft.com/office/powerpoint/2010/main" val="602233850"/>
+      </p:ext>
+    </p:extLst>
+  </p:cSld>
+  <p:clrMapOvr>
+    <a:masterClrMapping/>
+  </p:clrMapOvr>
+</p:sld>
+</file>
+
+<file path=ppt/slides/slide12.xml><?xml version="1.0" encoding="utf-8"?>
+<p:sld xmlns:a="http://schemas.openxmlformats.org/drawingml/2006/main" xmlns:r="http://schemas.openxmlformats.org/officeDocument/2006/relationships" xmlns:p="http://schemas.openxmlformats.org/presentationml/2006/main">
+  <p:cSld>
+    <p:spTree>
+      <p:nvGrpSpPr>
+        <p:cNvPr id="1" name=""/>
+        <p:cNvGrpSpPr/>
+        <p:nvPr/>
+      </p:nvGrpSpPr>
+      <p:grpSpPr>
+        <a:xfrm>
+          <a:off x="0" y="0"/>
+          <a:ext cx="0" cy="0"/>
+          <a:chOff x="0" y="0"/>
+          <a:chExt cx="0" cy="0"/>
+        </a:xfrm>
+      </p:grpSpPr>
+      <p:sp>
+        <p:nvSpPr>
+          <p:cNvPr id="2" name="Title 1"/>
+          <p:cNvSpPr>
+            <a:spLocks noGrp="1"/>
+          </p:cNvSpPr>
+          <p:nvPr>
+            <p:ph type="title"/>
+          </p:nvPr>
+        </p:nvSpPr>
+        <p:spPr/>
+        <p:txBody>
+          <a:bodyPr/>
+          <a:lstStyle/>
+          <a:p>
+            <a:r>
+              <a:rPr lang="en-US" dirty="0" err="1" smtClean="0"/>
+              <a:t>Hadoop</a:t>
+            </a:r>
+            <a:r>
+              <a:rPr lang="en-US" dirty="0" smtClean="0"/>
+              <a:t> </a:t>
+            </a:r>
+            <a:r>
+              <a:rPr lang="en-US" dirty="0" err="1" smtClean="0"/>
+              <a:t>MapReduce</a:t>
+            </a:r>
+            <a:endParaRPr lang="en-US" dirty="0"/>
+          </a:p>
+        </p:txBody>
+      </p:sp>
+      <p:sp>
+        <p:nvSpPr>
+          <p:cNvPr id="3" name="Content Placeholder 2"/>
+          <p:cNvSpPr>
+            <a:spLocks noGrp="1"/>
+          </p:cNvSpPr>
+          <p:nvPr>
+            <p:ph idx="1"/>
+          </p:nvPr>
+        </p:nvSpPr>
+        <p:spPr/>
+        <p:txBody>
+          <a:bodyPr/>
+          <a:lstStyle/>
+          <a:p>
+            <a:r>
+              <a:rPr lang="en-US" dirty="0">
+                <a:hlinkClick r:id="rId2"/>
+              </a:rPr>
+              <a:t>http://hadoop.apache.org/</a:t>
+            </a:r>
+            <a:endParaRPr lang="en-US" dirty="0" smtClean="0"/>
+          </a:p>
+          <a:p>
+            <a:r>
+              <a:rPr lang="en-US" dirty="0" smtClean="0"/>
+              <a:t>Open Source</a:t>
+            </a:r>
+          </a:p>
+          <a:p>
+            <a:r>
+              <a:rPr lang="en-US" dirty="0" smtClean="0"/>
+              <a:t>Distributed </a:t>
+            </a:r>
+            <a:r>
+              <a:rPr lang="en-US" dirty="0"/>
+              <a:t>processing of large data sets across clusters of </a:t>
+            </a:r>
+            <a:r>
+              <a:rPr lang="en-US" dirty="0" smtClean="0"/>
+              <a:t>commodity computers</a:t>
+            </a:r>
+          </a:p>
+          <a:p>
+            <a:pPr lvl="1"/>
+            <a:r>
+              <a:rPr lang="en-US" dirty="0" err="1" smtClean="0"/>
+              <a:t>Hadoop</a:t>
+            </a:r>
+            <a:r>
+              <a:rPr lang="en-US" dirty="0" smtClean="0"/>
+              <a:t> Distributed File System (HDFS)</a:t>
+            </a:r>
+          </a:p>
+          <a:p>
+            <a:pPr lvl="1"/>
+            <a:r>
+              <a:rPr lang="en-US" dirty="0" err="1" smtClean="0"/>
+              <a:t>Hadoop</a:t>
+            </a:r>
+            <a:r>
+              <a:rPr lang="en-US" dirty="0" smtClean="0"/>
+              <a:t> YARN: Job Scheduling and Cluster Resource Management</a:t>
+            </a:r>
+          </a:p>
+          <a:p>
+            <a:pPr lvl="1"/>
+            <a:r>
+              <a:rPr lang="en-US" dirty="0" err="1" smtClean="0"/>
+              <a:t>Hadoop</a:t>
+            </a:r>
+            <a:r>
+              <a:rPr lang="en-US" dirty="0" smtClean="0"/>
+              <a:t> </a:t>
+            </a:r>
+            <a:r>
+              <a:rPr lang="en-US" dirty="0" err="1" smtClean="0"/>
+              <a:t>MapReduce</a:t>
+            </a:r>
+            <a:endParaRPr lang="en-US" dirty="0" smtClean="0"/>
+          </a:p>
+          <a:p>
+            <a:pPr lvl="1"/>
+            <a:r>
+              <a:rPr lang="en-US" dirty="0" err="1" smtClean="0"/>
+              <a:t>Hadoop</a:t>
+            </a:r>
+            <a:r>
+              <a:rPr lang="en-US" dirty="0" smtClean="0"/>
+              <a:t> </a:t>
+            </a:r>
+            <a:r>
+              <a:rPr lang="en-US" dirty="0" err="1" smtClean="0"/>
+              <a:t>Hbase</a:t>
+            </a:r>
+            <a:endParaRPr lang="en-US" dirty="0" smtClean="0"/>
+          </a:p>
+          <a:p>
+            <a:pPr lvl="1"/>
+            <a:r>
+              <a:rPr lang="en-US" dirty="0" err="1" smtClean="0"/>
+              <a:t>Hadoop</a:t>
+            </a:r>
+            <a:r>
+              <a:rPr lang="en-US" dirty="0" smtClean="0"/>
+              <a:t> Cassandra</a:t>
+            </a:r>
+          </a:p>
+          <a:p>
+            <a:pPr lvl="1"/>
+            <a:r>
+              <a:rPr lang="en-US" dirty="0" err="1" smtClean="0"/>
+              <a:t>Hadoop</a:t>
+            </a:r>
+            <a:r>
+              <a:rPr lang="en-US" dirty="0" smtClean="0"/>
+              <a:t> Hive</a:t>
+            </a:r>
+            <a:endParaRPr lang="en-US" dirty="0"/>
+          </a:p>
+        </p:txBody>
+      </p:sp>
+    </p:spTree>
+    <p:extLst>
+      <p:ext uri="{BB962C8B-B14F-4D97-AF65-F5344CB8AC3E}">
+        <p14:creationId xmlns:p14="http://schemas.microsoft.com/office/powerpoint/2010/main" val="1664073357"/>
+      </p:ext>
+    </p:extLst>
+  </p:cSld>
+  <p:clrMapOvr>
+    <a:masterClrMapping/>
+  </p:clrMapOvr>
+</p:sld>
+</file>
+
+<file path=ppt/slides/slide13.xml><?xml version="1.0" encoding="utf-8"?>
+<p:sld xmlns:a="http://schemas.openxmlformats.org/drawingml/2006/main" xmlns:r="http://schemas.openxmlformats.org/officeDocument/2006/relationships" xmlns:p="http://schemas.openxmlformats.org/presentationml/2006/main">
+  <p:cSld>
+    <p:spTree>
+      <p:nvGrpSpPr>
+        <p:cNvPr id="1" name=""/>
+        <p:cNvGrpSpPr/>
+        <p:nvPr/>
+      </p:nvGrpSpPr>
+      <p:grpSpPr>
+        <a:xfrm>
+          <a:off x="0" y="0"/>
+          <a:ext cx="0" cy="0"/>
+          <a:chOff x="0" y="0"/>
+          <a:chExt cx="0" cy="0"/>
+        </a:xfrm>
+      </p:grpSpPr>
+      <p:sp>
+        <p:nvSpPr>
+          <p:cNvPr id="2" name="Title 1"/>
+          <p:cNvSpPr>
+            <a:spLocks noGrp="1"/>
+          </p:cNvSpPr>
+          <p:nvPr>
+            <p:ph type="title"/>
+          </p:nvPr>
+        </p:nvSpPr>
+        <p:spPr/>
+        <p:txBody>
+          <a:bodyPr/>
+          <a:lstStyle/>
+          <a:p>
+            <a:r>
+              <a:rPr lang="en-US" dirty="0" err="1" smtClean="0"/>
+              <a:t>Hadoop</a:t>
+            </a:r>
+            <a:r>
+              <a:rPr lang="en-US" dirty="0" smtClean="0"/>
+              <a:t> Components</a:t>
+            </a:r>
+            <a:endParaRPr lang="en-US" dirty="0"/>
+          </a:p>
+        </p:txBody>
+      </p:sp>
+      <p:sp>
+        <p:nvSpPr>
+          <p:cNvPr id="3" name="Content Placeholder 2"/>
+          <p:cNvSpPr>
+            <a:spLocks noGrp="1"/>
+          </p:cNvSpPr>
+          <p:nvPr>
+            <p:ph idx="1"/>
+          </p:nvPr>
+        </p:nvSpPr>
+        <p:spPr/>
+        <p:txBody>
+          <a:bodyPr/>
+          <a:lstStyle/>
+          <a:p>
+            <a:r>
+              <a:rPr lang="en-US" dirty="0" smtClean="0"/>
+              <a:t>Job Tracker</a:t>
+            </a:r>
+          </a:p>
+          <a:p>
+            <a:pPr lvl="1"/>
+            <a:r>
+              <a:rPr lang="en-US" dirty="0" smtClean="0"/>
+              <a:t>Runs in the Master node</a:t>
+            </a:r>
+          </a:p>
+          <a:p>
+            <a:pPr lvl="1"/>
+            <a:r>
+              <a:rPr lang="en-US" dirty="0" smtClean="0"/>
+              <a:t>Schedules jobs and keeps track of success/failed tasks</a:t>
+            </a:r>
+          </a:p>
+          <a:p>
+            <a:pPr lvl="1"/>
+            <a:r>
+              <a:rPr lang="en-US" dirty="0" smtClean="0"/>
+              <a:t>Accepts client requests for M/R jobs</a:t>
+            </a:r>
+          </a:p>
+          <a:p>
+            <a:pPr lvl="1"/>
+            <a:r>
+              <a:rPr lang="en-US" dirty="0" smtClean="0"/>
+              <a:t>Upon task failures, reschedules the task at a different Data node</a:t>
+            </a:r>
+          </a:p>
+          <a:p>
+            <a:r>
+              <a:rPr lang="en-US" dirty="0" smtClean="0"/>
+              <a:t>Task Tracker</a:t>
+            </a:r>
+          </a:p>
+          <a:p>
+            <a:pPr lvl="1"/>
+            <a:r>
+              <a:rPr lang="en-US" dirty="0" smtClean="0"/>
+              <a:t>Runs in the Data nodes</a:t>
+            </a:r>
+          </a:p>
+          <a:p>
+            <a:pPr lvl="1"/>
+            <a:r>
+              <a:rPr lang="en-US" dirty="0" smtClean="0"/>
+              <a:t>Controls the execution of a task (Map or Reduce) within the Data node</a:t>
+            </a:r>
+            <a:endParaRPr lang="en-US" dirty="0"/>
+          </a:p>
+        </p:txBody>
+      </p:sp>
+    </p:spTree>
+    <p:extLst>
+      <p:ext uri="{BB962C8B-B14F-4D97-AF65-F5344CB8AC3E}">
+        <p14:creationId xmlns:p14="http://schemas.microsoft.com/office/powerpoint/2010/main" val="1798756405"/>
+      </p:ext>
+    </p:extLst>
+  </p:cSld>
+  <p:clrMapOvr>
+    <a:masterClrMapping/>
+  </p:clrMapOvr>
+</p:sld>
+</file>
+
+<file path=ppt/slides/slide14.xml><?xml version="1.0" encoding="utf-8"?>
+<p:sld xmlns:a="http://schemas.openxmlformats.org/drawingml/2006/main" xmlns:r="http://schemas.openxmlformats.org/officeDocument/2006/relationships" xmlns:p="http://schemas.openxmlformats.org/presentationml/2006/main">
+  <p:cSld>
+    <p:spTree>
+      <p:nvGrpSpPr>
+        <p:cNvPr id="1" name=""/>
+        <p:cNvGrpSpPr/>
+        <p:nvPr/>
+      </p:nvGrpSpPr>
+      <p:grpSpPr>
+        <a:xfrm>
+          <a:off x="0" y="0"/>
+          <a:ext cx="0" cy="0"/>
+          <a:chOff x="0" y="0"/>
+          <a:chExt cx="0" cy="0"/>
+        </a:xfrm>
+      </p:grpSpPr>
+      <p:sp>
+        <p:nvSpPr>
+          <p:cNvPr id="2" name="Title 1"/>
+          <p:cNvSpPr>
+            <a:spLocks noGrp="1"/>
+          </p:cNvSpPr>
+          <p:nvPr>
+            <p:ph type="title"/>
+          </p:nvPr>
+        </p:nvSpPr>
+        <p:spPr/>
+        <p:txBody>
+          <a:bodyPr/>
+          <a:lstStyle/>
+          <a:p>
+            <a:r>
+              <a:rPr lang="en-US" dirty="0" err="1" smtClean="0"/>
+              <a:t>Hadoop</a:t>
+            </a:r>
+            <a:r>
+              <a:rPr lang="en-US" dirty="0" smtClean="0"/>
+              <a:t> Diagram</a:t>
+            </a:r>
+            <a:endParaRPr lang="en-US" dirty="0"/>
+          </a:p>
+        </p:txBody>
+      </p:sp>
+      <p:pic>
+        <p:nvPicPr>
+          <p:cNvPr id="4" name="Content Placeholder 3"/>
+          <p:cNvPicPr>
+            <a:picLocks noGrp="1" noChangeAspect="1"/>
+          </p:cNvPicPr>
+          <p:nvPr>
+            <p:ph idx="1"/>
+          </p:nvPr>
+        </p:nvPicPr>
+        <p:blipFill>
+          <a:blip r:embed="rId2">
+            <a:extLst>
+              <a:ext uri="{28A0092B-C50C-407E-A947-70E740481C1C}">
+                <a14:useLocalDpi xmlns:a14="http://schemas.microsoft.com/office/drawing/2010/main" val="0"/>
+              </a:ext>
+            </a:extLst>
+          </a:blip>
+          <a:stretch>
+            <a:fillRect/>
+          </a:stretch>
+        </p:blipFill>
+        <p:spPr>
+          <a:xfrm>
+            <a:off x="1065536" y="1774275"/>
+            <a:ext cx="8208466" cy="4356068"/>
+          </a:xfrm>
+        </p:spPr>
+      </p:pic>
+    </p:spTree>
+    <p:extLst>
+      <p:ext uri="{BB962C8B-B14F-4D97-AF65-F5344CB8AC3E}">
+        <p14:creationId xmlns:p14="http://schemas.microsoft.com/office/powerpoint/2010/main" val="2559472587"/>
+      </p:ext>
+    </p:extLst>
+  </p:cSld>
+  <p:clrMapOvr>
+    <a:masterClrMapping/>
+  </p:clrMapOvr>
+</p:sld>
+</file>
+
+<file path=ppt/slides/slide15.xml><?xml version="1.0" encoding="utf-8"?>
+<p:sld xmlns:a="http://schemas.openxmlformats.org/drawingml/2006/main" xmlns:r="http://schemas.openxmlformats.org/officeDocument/2006/relationships" xmlns:p="http://schemas.openxmlformats.org/presentationml/2006/main">
+  <p:cSld>
+    <p:spTree>
+      <p:nvGrpSpPr>
+        <p:cNvPr id="1" name=""/>
+        <p:cNvGrpSpPr/>
+        <p:nvPr/>
+      </p:nvGrpSpPr>
+      <p:grpSpPr>
+        <a:xfrm>
+          <a:off x="0" y="0"/>
+          <a:ext cx="0" cy="0"/>
+          <a:chOff x="0" y="0"/>
+          <a:chExt cx="0" cy="0"/>
+        </a:xfrm>
+      </p:grpSpPr>
+      <p:sp>
+        <p:nvSpPr>
+          <p:cNvPr id="2" name="Title 1"/>
+          <p:cNvSpPr>
+            <a:spLocks noGrp="1"/>
+          </p:cNvSpPr>
+          <p:nvPr>
+            <p:ph type="ctrTitle"/>
+          </p:nvPr>
+        </p:nvSpPr>
+        <p:spPr/>
+        <p:txBody>
+          <a:bodyPr/>
+          <a:lstStyle/>
+          <a:p>
+            <a:r>
+              <a:rPr lang="en-US" dirty="0" smtClean="0"/>
+              <a:t>Demo</a:t>
+            </a:r>
+            <a:endParaRPr lang="en-US" dirty="0"/>
+          </a:p>
+        </p:txBody>
+      </p:sp>
+      <p:sp>
+        <p:nvSpPr>
+          <p:cNvPr id="3" name="Subtitle 2"/>
+          <p:cNvSpPr>
+            <a:spLocks noGrp="1"/>
+          </p:cNvSpPr>
+          <p:nvPr>
+            <p:ph type="subTitle" idx="1"/>
+          </p:nvPr>
+        </p:nvSpPr>
+        <p:spPr/>
+        <p:txBody>
+          <a:bodyPr/>
+          <a:lstStyle/>
+          <a:p>
+            <a:r>
+              <a:rPr lang="en-US" dirty="0" err="1" smtClean="0"/>
+              <a:t>WordCount</a:t>
+            </a:r>
+            <a:endParaRPr lang="en-US" dirty="0"/>
+          </a:p>
+        </p:txBody>
+      </p:sp>
+    </p:spTree>
+    <p:extLst>
+      <p:ext uri="{BB962C8B-B14F-4D97-AF65-F5344CB8AC3E}">
+        <p14:creationId xmlns:p14="http://schemas.microsoft.com/office/powerpoint/2010/main" val="1211755639"/>
+      </p:ext>
+    </p:extLst>
+  </p:cSld>
+  <p:clrMapOvr>
+    <a:masterClrMapping/>
+  </p:clrMapOvr>
+</p:sld>
+</file>
+
+<file path=ppt/slides/slide16.xml><?xml version="1.0" encoding="utf-8"?>
+<p:sld xmlns:a="http://schemas.openxmlformats.org/drawingml/2006/main" xmlns:r="http://schemas.openxmlformats.org/officeDocument/2006/relationships" xmlns:p="http://schemas.openxmlformats.org/presentationml/2006/main">
+  <p:cSld>
+    <p:spTree>
+      <p:nvGrpSpPr>
+        <p:cNvPr id="1" name=""/>
+        <p:cNvGrpSpPr/>
+        <p:nvPr/>
+      </p:nvGrpSpPr>
+      <p:grpSpPr>
+        <a:xfrm>
+          <a:off x="0" y="0"/>
+          <a:ext cx="0" cy="0"/>
+          <a:chOff x="0" y="0"/>
+          <a:chExt cx="0" cy="0"/>
+        </a:xfrm>
+      </p:grpSpPr>
+      <p:sp>
+        <p:nvSpPr>
+          <p:cNvPr id="2" name="Title 1"/>
+          <p:cNvSpPr>
+            <a:spLocks noGrp="1"/>
+          </p:cNvSpPr>
+          <p:nvPr>
+            <p:ph type="title"/>
+          </p:nvPr>
+        </p:nvSpPr>
+        <p:spPr/>
+        <p:txBody>
+          <a:bodyPr/>
+          <a:lstStyle/>
+          <a:p>
+            <a:r>
+              <a:rPr lang="en-US" dirty="0" err="1" smtClean="0"/>
+              <a:t>WordCount</a:t>
+            </a:r>
+            <a:r>
+              <a:rPr lang="en-US" dirty="0" smtClean="0"/>
+              <a:t> - Mapper</a:t>
+            </a:r>
+            <a:endParaRPr lang="en-US" dirty="0"/>
+          </a:p>
+        </p:txBody>
+      </p:sp>
+      <p:pic>
+        <p:nvPicPr>
+          <p:cNvPr id="6" name="Content Placeholder 5"/>
+          <p:cNvPicPr>
+            <a:picLocks noGrp="1" noChangeAspect="1"/>
+          </p:cNvPicPr>
+          <p:nvPr>
+            <p:ph idx="1"/>
+          </p:nvPr>
+        </p:nvPicPr>
+        <p:blipFill>
+          <a:blip r:embed="rId2"/>
+          <a:stretch>
+            <a:fillRect/>
+          </a:stretch>
+        </p:blipFill>
+        <p:spPr>
+          <a:xfrm>
+            <a:off x="962945" y="1930400"/>
+            <a:ext cx="8644774" cy="4676462"/>
+          </a:xfrm>
+          <a:prstGeom prst="rect">
+            <a:avLst/>
+          </a:prstGeom>
+        </p:spPr>
+      </p:pic>
+    </p:spTree>
+    <p:extLst>
+      <p:ext uri="{BB962C8B-B14F-4D97-AF65-F5344CB8AC3E}">
+        <p14:creationId xmlns:p14="http://schemas.microsoft.com/office/powerpoint/2010/main" val="3369880456"/>
+      </p:ext>
+    </p:extLst>
+  </p:cSld>
+  <p:clrMapOvr>
+    <a:masterClrMapping/>
+  </p:clrMapOvr>
+</p:sld>
+</file>
+
+<file path=ppt/slides/slide17.xml><?xml version="1.0" encoding="utf-8"?>
+<p:sld xmlns:a="http://schemas.openxmlformats.org/drawingml/2006/main" xmlns:r="http://schemas.openxmlformats.org/officeDocument/2006/relationships" xmlns:p="http://schemas.openxmlformats.org/presentationml/2006/main">
+  <p:cSld>
+    <p:spTree>
+      <p:nvGrpSpPr>
+        <p:cNvPr id="1" name=""/>
+        <p:cNvGrpSpPr/>
+        <p:nvPr/>
+      </p:nvGrpSpPr>
+      <p:grpSpPr>
+        <a:xfrm>
+          <a:off x="0" y="0"/>
+          <a:ext cx="0" cy="0"/>
+          <a:chOff x="0" y="0"/>
+          <a:chExt cx="0" cy="0"/>
+        </a:xfrm>
+      </p:grpSpPr>
+      <p:sp>
+        <p:nvSpPr>
+          <p:cNvPr id="2" name="Title 1"/>
+          <p:cNvSpPr>
+            <a:spLocks noGrp="1"/>
+          </p:cNvSpPr>
+          <p:nvPr>
+            <p:ph type="title"/>
+          </p:nvPr>
+        </p:nvSpPr>
+        <p:spPr/>
+        <p:txBody>
+          <a:bodyPr/>
+          <a:lstStyle/>
+          <a:p>
+            <a:r>
+              <a:rPr lang="en-US" dirty="0" err="1" smtClean="0"/>
+              <a:t>WordCount</a:t>
+            </a:r>
+            <a:r>
+              <a:rPr lang="en-US" dirty="0" smtClean="0"/>
+              <a:t> - Reducer</a:t>
+            </a:r>
+            <a:endParaRPr lang="en-US" dirty="0"/>
+          </a:p>
+        </p:txBody>
+      </p:sp>
+      <p:pic>
+        <p:nvPicPr>
+          <p:cNvPr id="6" name="Content Placeholder 5"/>
+          <p:cNvPicPr>
+            <a:picLocks noGrp="1" noChangeAspect="1"/>
+          </p:cNvPicPr>
+          <p:nvPr>
+            <p:ph idx="1"/>
+          </p:nvPr>
+        </p:nvPicPr>
+        <p:blipFill>
+          <a:blip r:embed="rId2"/>
+          <a:stretch>
+            <a:fillRect/>
+          </a:stretch>
+        </p:blipFill>
+        <p:spPr>
+          <a:xfrm>
+            <a:off x="415650" y="2202287"/>
+            <a:ext cx="10237088" cy="4262907"/>
+          </a:xfrm>
+          <a:prstGeom prst="rect">
+            <a:avLst/>
+          </a:prstGeom>
+        </p:spPr>
+      </p:pic>
+    </p:spTree>
+    <p:extLst>
+      <p:ext uri="{BB962C8B-B14F-4D97-AF65-F5344CB8AC3E}">
+        <p14:creationId xmlns:p14="http://schemas.microsoft.com/office/powerpoint/2010/main" val="3041687706"/>
+      </p:ext>
+    </p:extLst>
+  </p:cSld>
+  <p:clrMapOvr>
+    <a:masterClrMapping/>
+  </p:clrMapOvr>
+</p:sld>
+</file>
+
+<file path=ppt/slides/slide18.xml><?xml version="1.0" encoding="utf-8"?>
+<p:sld xmlns:a="http://schemas.openxmlformats.org/drawingml/2006/main" xmlns:r="http://schemas.openxmlformats.org/officeDocument/2006/relationships" xmlns:p="http://schemas.openxmlformats.org/presentationml/2006/main">
+  <p:cSld>
+    <p:spTree>
+      <p:nvGrpSpPr>
+        <p:cNvPr id="1" name=""/>
+        <p:cNvGrpSpPr/>
+        <p:nvPr/>
+      </p:nvGrpSpPr>
+      <p:grpSpPr>
+        <a:xfrm>
+          <a:off x="0" y="0"/>
+          <a:ext cx="0" cy="0"/>
+          <a:chOff x="0" y="0"/>
+          <a:chExt cx="0" cy="0"/>
+        </a:xfrm>
+      </p:grpSpPr>
+      <p:sp>
+        <p:nvSpPr>
+          <p:cNvPr id="2" name="Title 1"/>
+          <p:cNvSpPr>
+            <a:spLocks noGrp="1"/>
+          </p:cNvSpPr>
+          <p:nvPr>
+            <p:ph type="ctrTitle"/>
+          </p:nvPr>
+        </p:nvSpPr>
+        <p:spPr/>
+        <p:txBody>
+          <a:bodyPr/>
+          <a:lstStyle/>
+          <a:p>
+            <a:r>
+              <a:rPr lang="en-US" dirty="0" smtClean="0"/>
+              <a:t>Demo</a:t>
+            </a:r>
+            <a:endParaRPr lang="en-US" dirty="0"/>
+          </a:p>
+        </p:txBody>
+      </p:sp>
+      <p:sp>
+        <p:nvSpPr>
+          <p:cNvPr id="3" name="Subtitle 2"/>
+          <p:cNvSpPr>
+            <a:spLocks noGrp="1"/>
+          </p:cNvSpPr>
+          <p:nvPr>
+            <p:ph type="subTitle" idx="1"/>
+          </p:nvPr>
+        </p:nvSpPr>
+        <p:spPr/>
+        <p:txBody>
+          <a:bodyPr/>
+          <a:lstStyle/>
+          <a:p>
+            <a:r>
+              <a:rPr lang="en-US" dirty="0" smtClean="0"/>
+              <a:t>HTML Tag Count</a:t>
+            </a:r>
+            <a:endParaRPr lang="en-US" dirty="0"/>
+          </a:p>
+        </p:txBody>
+      </p:sp>
+    </p:spTree>
+    <p:extLst>
+      <p:ext uri="{BB962C8B-B14F-4D97-AF65-F5344CB8AC3E}">
+        <p14:creationId xmlns:p14="http://schemas.microsoft.com/office/powerpoint/2010/main" val="1513246165"/>
+      </p:ext>
+    </p:extLst>
+  </p:cSld>
+  <p:clrMapOvr>
+    <a:masterClrMapping/>
+  </p:clrMapOvr>
+</p:sld>
+</file>
+
+<file path=ppt/slides/slide19.xml><?xml version="1.0" encoding="utf-8"?>
+<p:sld xmlns:a="http://schemas.openxmlformats.org/drawingml/2006/main" xmlns:r="http://schemas.openxmlformats.org/officeDocument/2006/relationships" xmlns:p="http://schemas.openxmlformats.org/presentationml/2006/main">
+  <p:cSld>
+    <p:spTree>
+      <p:nvGrpSpPr>
+        <p:cNvPr id="1" name=""/>
+        <p:cNvGrpSpPr/>
+        <p:nvPr/>
+      </p:nvGrpSpPr>
+      <p:grpSpPr>
+        <a:xfrm>
+          <a:off x="0" y="0"/>
+          <a:ext cx="0" cy="0"/>
+          <a:chOff x="0" y="0"/>
+          <a:chExt cx="0" cy="0"/>
+        </a:xfrm>
+      </p:grpSpPr>
+      <p:sp>
+        <p:nvSpPr>
+          <p:cNvPr id="2" name="Title 1"/>
+          <p:cNvSpPr>
+            <a:spLocks noGrp="1"/>
+          </p:cNvSpPr>
+          <p:nvPr>
+            <p:ph type="title"/>
+          </p:nvPr>
+        </p:nvSpPr>
+        <p:spPr/>
+        <p:txBody>
+          <a:bodyPr/>
+          <a:lstStyle/>
+          <a:p>
+            <a:r>
+              <a:rPr lang="en-US" dirty="0" smtClean="0"/>
+              <a:t>HTML Tag Count - Mapper</a:t>
+            </a:r>
+            <a:endParaRPr lang="en-US" dirty="0"/>
+          </a:p>
+        </p:txBody>
+      </p:sp>
+      <p:pic>
+        <p:nvPicPr>
+          <p:cNvPr id="4" name="Content Placeholder 3"/>
+          <p:cNvPicPr>
+            <a:picLocks noGrp="1" noChangeAspect="1"/>
+          </p:cNvPicPr>
+          <p:nvPr>
+            <p:ph idx="1"/>
+          </p:nvPr>
+        </p:nvPicPr>
+        <p:blipFill>
+          <a:blip r:embed="rId2"/>
+          <a:stretch>
+            <a:fillRect/>
+          </a:stretch>
+        </p:blipFill>
+        <p:spPr>
+          <a:xfrm>
+            <a:off x="406834" y="2421228"/>
+            <a:ext cx="10822948" cy="3979572"/>
+          </a:xfrm>
+          <a:prstGeom prst="rect">
+            <a:avLst/>
+          </a:prstGeom>
+        </p:spPr>
+      </p:pic>
+    </p:spTree>
+    <p:extLst>
+      <p:ext uri="{BB962C8B-B14F-4D97-AF65-F5344CB8AC3E}">
+        <p14:creationId xmlns:p14="http://schemas.microsoft.com/office/powerpoint/2010/main" val="3274591716"/>
+      </p:ext>
+    </p:extLst>
+  </p:cSld>
+  <p:clrMapOvr>
+    <a:masterClrMapping/>
+  </p:clrMapOvr>
+</p:sld>
+</file>
+
 <file path=ppt/slides/slide2.xml><?xml version="1.0" encoding="utf-8"?>
 <p:sld xmlns:a="http://schemas.openxmlformats.org/drawingml/2006/main" xmlns:r="http://schemas.openxmlformats.org/officeDocument/2006/relationships" xmlns:p="http://schemas.openxmlformats.org/presentationml/2006/main">
   <p:cSld>
@@ -5976,10 +7032,53 @@
               <a:t>cluster</a:t>
             </a:r>
             <a:r>
-              <a:rPr lang="en-US" dirty="0"/>
+              <a:rPr lang="en-US" dirty="0" smtClean="0"/>
               <a:t>.</a:t>
             </a:r>
-            <a:endParaRPr lang="en-US" dirty="0"/>
+          </a:p>
+          <a:p>
+            <a:r>
+              <a:rPr lang="en-US" dirty="0" smtClean="0"/>
+              <a:t>In essence</a:t>
+            </a:r>
+          </a:p>
+          <a:p>
+            <a:pPr lvl="1"/>
+            <a:r>
+              <a:rPr lang="en-US" dirty="0" smtClean="0"/>
+              <a:t>A different paradigm</a:t>
+            </a:r>
+          </a:p>
+          <a:p>
+            <a:pPr lvl="1"/>
+            <a:r>
+              <a:rPr lang="en-US" dirty="0" smtClean="0"/>
+              <a:t>Process large data sets thru simple operations</a:t>
+            </a:r>
+          </a:p>
+          <a:p>
+            <a:pPr lvl="1"/>
+            <a:r>
+              <a:rPr lang="en-US" dirty="0" smtClean="0"/>
+              <a:t>A goal can be achieved thru 1 or more </a:t>
+            </a:r>
+            <a:r>
+              <a:rPr lang="en-US" dirty="0" err="1" smtClean="0"/>
+              <a:t>MapReduce</a:t>
+            </a:r>
+            <a:r>
+              <a:rPr lang="en-US" dirty="0" smtClean="0"/>
+              <a:t> operations</a:t>
+            </a:r>
+          </a:p>
+          <a:p>
+            <a:endParaRPr lang="en-US" dirty="0"/>
+          </a:p>
+          <a:p>
+            <a:r>
+              <a:rPr lang="en-US" dirty="0" smtClean="0"/>
+              <a:t>Forget everything you know, and go back to basics… to the simplest!</a:t>
+            </a:r>
           </a:p>
         </p:txBody>
       </p:sp>
@@ -5987,6 +7086,210 @@
     <p:extLst>
       <p:ext uri="{BB962C8B-B14F-4D97-AF65-F5344CB8AC3E}">
         <p14:creationId xmlns:p14="http://schemas.microsoft.com/office/powerpoint/2010/main" val="4166833153"/>
+      </p:ext>
+    </p:extLst>
+  </p:cSld>
+  <p:clrMapOvr>
+    <a:masterClrMapping/>
+  </p:clrMapOvr>
+</p:sld>
+</file>
+
+<file path=ppt/slides/slide20.xml><?xml version="1.0" encoding="utf-8"?>
+<p:sld xmlns:a="http://schemas.openxmlformats.org/drawingml/2006/main" xmlns:r="http://schemas.openxmlformats.org/officeDocument/2006/relationships" xmlns:p="http://schemas.openxmlformats.org/presentationml/2006/main">
+  <p:cSld>
+    <p:spTree>
+      <p:nvGrpSpPr>
+        <p:cNvPr id="1" name=""/>
+        <p:cNvGrpSpPr/>
+        <p:nvPr/>
+      </p:nvGrpSpPr>
+      <p:grpSpPr>
+        <a:xfrm>
+          <a:off x="0" y="0"/>
+          <a:ext cx="0" cy="0"/>
+          <a:chOff x="0" y="0"/>
+          <a:chExt cx="0" cy="0"/>
+        </a:xfrm>
+      </p:grpSpPr>
+      <p:sp>
+        <p:nvSpPr>
+          <p:cNvPr id="2" name="Title 1"/>
+          <p:cNvSpPr>
+            <a:spLocks noGrp="1"/>
+          </p:cNvSpPr>
+          <p:nvPr>
+            <p:ph type="title"/>
+          </p:nvPr>
+        </p:nvSpPr>
+        <p:spPr/>
+        <p:txBody>
+          <a:bodyPr/>
+          <a:lstStyle/>
+          <a:p>
+            <a:r>
+              <a:rPr lang="en-US" dirty="0" smtClean="0"/>
+              <a:t>HTML Tag Count - Reducer</a:t>
+            </a:r>
+            <a:endParaRPr lang="en-US" dirty="0"/>
+          </a:p>
+        </p:txBody>
+      </p:sp>
+      <p:pic>
+        <p:nvPicPr>
+          <p:cNvPr id="4" name="Content Placeholder 3"/>
+          <p:cNvPicPr>
+            <a:picLocks noGrp="1" noChangeAspect="1"/>
+          </p:cNvPicPr>
+          <p:nvPr>
+            <p:ph idx="1"/>
+          </p:nvPr>
+        </p:nvPicPr>
+        <p:blipFill>
+          <a:blip r:embed="rId2"/>
+          <a:stretch>
+            <a:fillRect/>
+          </a:stretch>
+        </p:blipFill>
+        <p:spPr>
+          <a:xfrm>
+            <a:off x="579549" y="2057507"/>
+            <a:ext cx="9465971" cy="4400474"/>
+          </a:xfrm>
+          <a:prstGeom prst="rect">
+            <a:avLst/>
+          </a:prstGeom>
+        </p:spPr>
+      </p:pic>
+    </p:spTree>
+    <p:extLst>
+      <p:ext uri="{BB962C8B-B14F-4D97-AF65-F5344CB8AC3E}">
+        <p14:creationId xmlns:p14="http://schemas.microsoft.com/office/powerpoint/2010/main" val="2111106448"/>
+      </p:ext>
+    </p:extLst>
+  </p:cSld>
+  <p:clrMapOvr>
+    <a:masterClrMapping/>
+  </p:clrMapOvr>
+</p:sld>
+</file>
+
+<file path=ppt/slides/slide21.xml><?xml version="1.0" encoding="utf-8"?>
+<p:sld xmlns:a="http://schemas.openxmlformats.org/drawingml/2006/main" xmlns:r="http://schemas.openxmlformats.org/officeDocument/2006/relationships" xmlns:p="http://schemas.openxmlformats.org/presentationml/2006/main">
+  <p:cSld>
+    <p:spTree>
+      <p:nvGrpSpPr>
+        <p:cNvPr id="1" name=""/>
+        <p:cNvGrpSpPr/>
+        <p:nvPr/>
+      </p:nvGrpSpPr>
+      <p:grpSpPr>
+        <a:xfrm>
+          <a:off x="0" y="0"/>
+          <a:ext cx="0" cy="0"/>
+          <a:chOff x="0" y="0"/>
+          <a:chExt cx="0" cy="0"/>
+        </a:xfrm>
+      </p:grpSpPr>
+      <p:sp>
+        <p:nvSpPr>
+          <p:cNvPr id="2" name="Title 1"/>
+          <p:cNvSpPr>
+            <a:spLocks noGrp="1"/>
+          </p:cNvSpPr>
+          <p:nvPr>
+            <p:ph type="title"/>
+          </p:nvPr>
+        </p:nvSpPr>
+        <p:spPr/>
+        <p:txBody>
+          <a:bodyPr/>
+          <a:lstStyle/>
+          <a:p>
+            <a:r>
+              <a:rPr lang="en-US" dirty="0" smtClean="0"/>
+              <a:t>References</a:t>
+            </a:r>
+            <a:endParaRPr lang="en-US" dirty="0"/>
+          </a:p>
+        </p:txBody>
+      </p:sp>
+      <p:sp>
+        <p:nvSpPr>
+          <p:cNvPr id="3" name="Content Placeholder 2"/>
+          <p:cNvSpPr>
+            <a:spLocks noGrp="1"/>
+          </p:cNvSpPr>
+          <p:nvPr>
+            <p:ph idx="1"/>
+          </p:nvPr>
+        </p:nvSpPr>
+        <p:spPr/>
+        <p:txBody>
+          <a:bodyPr/>
+          <a:lstStyle/>
+          <a:p>
+            <a:r>
+              <a:rPr lang="en-US" dirty="0">
+                <a:hlinkClick r:id="rId2"/>
+              </a:rPr>
+              <a:t>http://en.wikipedia.org/wiki/MapReduce</a:t>
+            </a:r>
+            <a:endParaRPr lang="en-US" dirty="0" smtClean="0">
+              <a:hlinkClick r:id="rId3"/>
+            </a:endParaRPr>
+          </a:p>
+          <a:p>
+            <a:r>
+              <a:rPr lang="en-US" dirty="0" smtClean="0">
+                <a:hlinkClick r:id="rId3"/>
+              </a:rPr>
+              <a:t>http</a:t>
+            </a:r>
+            <a:r>
+              <a:rPr lang="en-US" dirty="0">
+                <a:hlinkClick r:id="rId3"/>
+              </a:rPr>
+              <a:t>://</a:t>
+            </a:r>
+            <a:r>
+              <a:rPr lang="en-US" dirty="0" smtClean="0">
+                <a:hlinkClick r:id="rId3"/>
+              </a:rPr>
+              <a:t>en.wikipedia.org/wiki/Hadoop</a:t>
+            </a:r>
+            <a:endParaRPr lang="en-US" dirty="0" smtClean="0"/>
+          </a:p>
+          <a:p>
+            <a:r>
+              <a:rPr lang="en-US" dirty="0">
+                <a:hlinkClick r:id="rId4"/>
+              </a:rPr>
+              <a:t>http://hadoop.apache.org</a:t>
+            </a:r>
+            <a:r>
+              <a:rPr lang="en-US" dirty="0" smtClean="0">
+                <a:hlinkClick r:id="rId4"/>
+              </a:rPr>
+              <a:t>/</a:t>
+            </a:r>
+            <a:endParaRPr lang="en-US" dirty="0" smtClean="0"/>
+          </a:p>
+          <a:p>
+            <a:r>
+              <a:rPr lang="en-US" dirty="0">
+                <a:hlinkClick r:id="rId5"/>
+              </a:rPr>
+              <a:t>http://hadoop.apache.org/docs/stable/mapred_tutorial.html</a:t>
+            </a:r>
+            <a:endParaRPr lang="en-US" dirty="0"/>
+          </a:p>
+        </p:txBody>
+      </p:sp>
+    </p:spTree>
+    <p:extLst>
+      <p:ext uri="{BB962C8B-B14F-4D97-AF65-F5344CB8AC3E}">
+        <p14:creationId xmlns:p14="http://schemas.microsoft.com/office/powerpoint/2010/main" val="3958380108"/>
       </p:ext>
     </p:extLst>
   </p:cSld>
@@ -6034,7 +7337,7 @@
             </a:r>
             <a:r>
               <a:rPr lang="en-US" dirty="0" smtClean="0"/>
-              <a:t> Implementations</a:t>
+              <a:t> Dataflow</a:t>
             </a:r>
             <a:endParaRPr lang="en-US" dirty="0"/>
           </a:p>
@@ -6055,14 +7358,969 @@
           <a:bodyPr/>
           <a:lstStyle/>
           <a:p>
-            <a:endParaRPr lang="en-US"/>
+            <a:r>
+              <a:rPr lang="en-US" dirty="0" smtClean="0"/>
+              <a:t>Input Reader and Input Splits</a:t>
+            </a:r>
+          </a:p>
+          <a:p>
+            <a:r>
+              <a:rPr lang="en-US" dirty="0" smtClean="0"/>
+              <a:t>Map</a:t>
+            </a:r>
+          </a:p>
+          <a:p>
+            <a:r>
+              <a:rPr lang="en-US" dirty="0" smtClean="0"/>
+              <a:t>Combine</a:t>
+            </a:r>
+          </a:p>
+          <a:p>
+            <a:r>
+              <a:rPr lang="en-US" dirty="0" smtClean="0"/>
+              <a:t>Sort</a:t>
+            </a:r>
+          </a:p>
+          <a:p>
+            <a:r>
+              <a:rPr lang="en-US" dirty="0" smtClean="0"/>
+              <a:t>Reduce</a:t>
+            </a:r>
+          </a:p>
+          <a:p>
+            <a:r>
+              <a:rPr lang="en-US" dirty="0" smtClean="0"/>
+              <a:t>Output Writer</a:t>
+            </a:r>
+          </a:p>
+          <a:p>
+            <a:endParaRPr lang="en-US" dirty="0"/>
+          </a:p>
+          <a:p>
+            <a:r>
+              <a:rPr lang="en-US" dirty="0" smtClean="0"/>
+              <a:t>Example: </a:t>
+            </a:r>
+          </a:p>
+          <a:p>
+            <a:pPr lvl="1"/>
+            <a:r>
+              <a:rPr lang="en-US" dirty="0" smtClean="0"/>
+              <a:t>Count lines per file in a set of files</a:t>
+            </a:r>
+            <a:endParaRPr lang="en-US" dirty="0"/>
           </a:p>
         </p:txBody>
       </p:sp>
     </p:spTree>
     <p:extLst>
       <p:ext uri="{BB962C8B-B14F-4D97-AF65-F5344CB8AC3E}">
-        <p14:creationId xmlns:p14="http://schemas.microsoft.com/office/powerpoint/2010/main" val="1664073357"/>
+        <p14:creationId xmlns:p14="http://schemas.microsoft.com/office/powerpoint/2010/main" val="2163587829"/>
+      </p:ext>
+    </p:extLst>
+  </p:cSld>
+  <p:clrMapOvr>
+    <a:masterClrMapping/>
+  </p:clrMapOvr>
+</p:sld>
+</file>
+
+<file path=ppt/slides/slide4.xml><?xml version="1.0" encoding="utf-8"?>
+<p:sld xmlns:a="http://schemas.openxmlformats.org/drawingml/2006/main" xmlns:r="http://schemas.openxmlformats.org/officeDocument/2006/relationships" xmlns:p="http://schemas.openxmlformats.org/presentationml/2006/main">
+  <p:cSld>
+    <p:spTree>
+      <p:nvGrpSpPr>
+        <p:cNvPr id="1" name=""/>
+        <p:cNvGrpSpPr/>
+        <p:nvPr/>
+      </p:nvGrpSpPr>
+      <p:grpSpPr>
+        <a:xfrm>
+          <a:off x="0" y="0"/>
+          <a:ext cx="0" cy="0"/>
+          <a:chOff x="0" y="0"/>
+          <a:chExt cx="0" cy="0"/>
+        </a:xfrm>
+      </p:grpSpPr>
+      <p:sp>
+        <p:nvSpPr>
+          <p:cNvPr id="2" name="Title 1"/>
+          <p:cNvSpPr>
+            <a:spLocks noGrp="1"/>
+          </p:cNvSpPr>
+          <p:nvPr>
+            <p:ph type="title"/>
+          </p:nvPr>
+        </p:nvSpPr>
+        <p:spPr/>
+        <p:txBody>
+          <a:bodyPr/>
+          <a:lstStyle/>
+          <a:p>
+            <a:r>
+              <a:rPr lang="en-US" dirty="0" smtClean="0"/>
+              <a:t>Dataflow – Input Reader and Input Splits</a:t>
+            </a:r>
+            <a:endParaRPr lang="en-US" dirty="0"/>
+          </a:p>
+        </p:txBody>
+      </p:sp>
+      <p:sp>
+        <p:nvSpPr>
+          <p:cNvPr id="3" name="Text Placeholder 2"/>
+          <p:cNvSpPr>
+            <a:spLocks noGrp="1"/>
+          </p:cNvSpPr>
+          <p:nvPr>
+            <p:ph idx="1"/>
+          </p:nvPr>
+        </p:nvSpPr>
+        <p:spPr/>
+        <p:txBody>
+          <a:bodyPr>
+            <a:normAutofit fontScale="92500" lnSpcReduction="10000"/>
+          </a:bodyPr>
+          <a:lstStyle/>
+          <a:p>
+            <a:r>
+              <a:rPr lang="en-US" dirty="0" smtClean="0"/>
+              <a:t>Split the input data set into small /easily manageable chunks called Splits</a:t>
+            </a:r>
+          </a:p>
+          <a:p>
+            <a:r>
+              <a:rPr lang="en-US" dirty="0" smtClean="0"/>
+              <a:t>Each Split is fed into a Map function (Mapper) for processing</a:t>
+            </a:r>
+          </a:p>
+          <a:p>
+            <a:r>
+              <a:rPr lang="en-US" dirty="0" smtClean="0"/>
+              <a:t>Input can be:</a:t>
+            </a:r>
+          </a:p>
+          <a:p>
+            <a:pPr lvl="1"/>
+            <a:r>
+              <a:rPr lang="en-US" dirty="0" smtClean="0"/>
+              <a:t>Usually text files, where each new line is a record to process</a:t>
+            </a:r>
+          </a:p>
+          <a:p>
+            <a:pPr lvl="1"/>
+            <a:r>
+              <a:rPr lang="en-US" dirty="0" smtClean="0"/>
+              <a:t>Several small files</a:t>
+            </a:r>
+          </a:p>
+          <a:p>
+            <a:pPr lvl="1"/>
+            <a:r>
+              <a:rPr lang="en-US" dirty="0" smtClean="0"/>
+              <a:t>A single large splittable file (important factors: format, compression)</a:t>
+            </a:r>
+          </a:p>
+          <a:p>
+            <a:r>
+              <a:rPr lang="en-US" dirty="0" smtClean="0"/>
+              <a:t>Input Reader understands the format of the input files</a:t>
+            </a:r>
+          </a:p>
+          <a:p>
+            <a:pPr lvl="1"/>
+            <a:r>
+              <a:rPr lang="en-US" dirty="0" smtClean="0"/>
+              <a:t>Binary or Text? Compressed or Plain? UTF-8 or ASCII? CSV or JSON?</a:t>
+            </a:r>
+          </a:p>
+          <a:p>
+            <a:endParaRPr lang="en-US" dirty="0"/>
+          </a:p>
+          <a:p>
+            <a:r>
+              <a:rPr lang="en-US" dirty="0" smtClean="0"/>
+              <a:t>Example: </a:t>
+            </a:r>
+          </a:p>
+          <a:p>
+            <a:pPr lvl="1"/>
+            <a:r>
+              <a:rPr lang="en-US" dirty="0" smtClean="0"/>
+              <a:t>A set of 10 text files (i.e. application log files) -&gt; 10 Splits of data</a:t>
+            </a:r>
+          </a:p>
+        </p:txBody>
+      </p:sp>
+    </p:spTree>
+    <p:extLst>
+      <p:ext uri="{BB962C8B-B14F-4D97-AF65-F5344CB8AC3E}">
+        <p14:creationId xmlns:p14="http://schemas.microsoft.com/office/powerpoint/2010/main" val="1107655900"/>
+      </p:ext>
+    </p:extLst>
+  </p:cSld>
+  <p:clrMapOvr>
+    <a:masterClrMapping/>
+  </p:clrMapOvr>
+</p:sld>
+</file>
+
+<file path=ppt/slides/slide5.xml><?xml version="1.0" encoding="utf-8"?>
+<p:sld xmlns:a="http://schemas.openxmlformats.org/drawingml/2006/main" xmlns:r="http://schemas.openxmlformats.org/officeDocument/2006/relationships" xmlns:p="http://schemas.openxmlformats.org/presentationml/2006/main">
+  <p:cSld>
+    <p:spTree>
+      <p:nvGrpSpPr>
+        <p:cNvPr id="1" name=""/>
+        <p:cNvGrpSpPr/>
+        <p:nvPr/>
+      </p:nvGrpSpPr>
+      <p:grpSpPr>
+        <a:xfrm>
+          <a:off x="0" y="0"/>
+          <a:ext cx="0" cy="0"/>
+          <a:chOff x="0" y="0"/>
+          <a:chExt cx="0" cy="0"/>
+        </a:xfrm>
+      </p:grpSpPr>
+      <p:sp>
+        <p:nvSpPr>
+          <p:cNvPr id="2" name="Title 1"/>
+          <p:cNvSpPr>
+            <a:spLocks noGrp="1"/>
+          </p:cNvSpPr>
+          <p:nvPr>
+            <p:ph type="title"/>
+          </p:nvPr>
+        </p:nvSpPr>
+        <p:spPr/>
+        <p:txBody>
+          <a:bodyPr/>
+          <a:lstStyle/>
+          <a:p>
+            <a:r>
+              <a:rPr lang="en-US" dirty="0" smtClean="0"/>
+              <a:t>Dataflow - Map</a:t>
+            </a:r>
+            <a:endParaRPr lang="en-US" dirty="0"/>
+          </a:p>
+        </p:txBody>
+      </p:sp>
+      <p:sp>
+        <p:nvSpPr>
+          <p:cNvPr id="3" name="Content Placeholder 2"/>
+          <p:cNvSpPr>
+            <a:spLocks noGrp="1"/>
+          </p:cNvSpPr>
+          <p:nvPr>
+            <p:ph idx="1"/>
+          </p:nvPr>
+        </p:nvSpPr>
+        <p:spPr/>
+        <p:txBody>
+          <a:bodyPr>
+            <a:normAutofit fontScale="92500" lnSpcReduction="20000"/>
+          </a:bodyPr>
+          <a:lstStyle/>
+          <a:p>
+            <a:r>
+              <a:rPr lang="en-US" dirty="0" smtClean="0"/>
+              <a:t>Required Phase</a:t>
+            </a:r>
+          </a:p>
+          <a:p>
+            <a:pPr lvl="1"/>
+            <a:r>
+              <a:rPr lang="en-US" dirty="0" smtClean="0"/>
+              <a:t>Though it can be an Identity Mapper</a:t>
+            </a:r>
+          </a:p>
+          <a:p>
+            <a:r>
+              <a:rPr lang="en-US" dirty="0" smtClean="0"/>
+              <a:t>A Map function (Mapper) will take the input split, and process each record (line)</a:t>
+            </a:r>
+          </a:p>
+          <a:p>
+            <a:pPr lvl="1"/>
+            <a:r>
+              <a:rPr lang="en-US" dirty="0" smtClean="0"/>
+              <a:t>The objective is to project, mutate the data into what needs to be Reduced</a:t>
+            </a:r>
+          </a:p>
+          <a:p>
+            <a:r>
+              <a:rPr lang="en-US" dirty="0" smtClean="0"/>
+              <a:t>Write a Key/Value pair to the intermediate output for the Reducer to feed from</a:t>
+            </a:r>
+          </a:p>
+          <a:p>
+            <a:pPr lvl="1"/>
+            <a:r>
+              <a:rPr lang="en-US" dirty="0" smtClean="0"/>
+              <a:t>Key: Will be used to group all mapped outputs with the same Key together</a:t>
+            </a:r>
+          </a:p>
+          <a:p>
+            <a:pPr lvl="1"/>
+            <a:r>
+              <a:rPr lang="en-US" dirty="0" smtClean="0"/>
+              <a:t>Value: Will be grouped with all other output values that share the same Key</a:t>
+            </a:r>
+          </a:p>
+          <a:p>
+            <a:pPr lvl="1"/>
+            <a:r>
+              <a:rPr lang="en-US" dirty="0" smtClean="0"/>
+              <a:t>Can write 0 or more Key/Value pairs per input record</a:t>
+            </a:r>
+          </a:p>
+          <a:p>
+            <a:r>
+              <a:rPr lang="en-US" dirty="0" smtClean="0"/>
+              <a:t>Number of Mappers depends on the # of Input Splits</a:t>
+            </a:r>
+          </a:p>
+          <a:p>
+            <a:endParaRPr lang="en-US" dirty="0"/>
+          </a:p>
+          <a:p>
+            <a:r>
+              <a:rPr lang="en-US" dirty="0" smtClean="0"/>
+              <a:t>Example:</a:t>
+            </a:r>
+          </a:p>
+          <a:p>
+            <a:pPr lvl="1"/>
+            <a:r>
+              <a:rPr lang="en-US" dirty="0" smtClean="0"/>
+              <a:t>Mapper writes </a:t>
+            </a:r>
+            <a:r>
+              <a:rPr lang="en-US" dirty="0" smtClean="0">
+                <a:latin typeface="Courier New" panose="02070309020205020404" pitchFamily="49" charset="0"/>
+                <a:cs typeface="Courier New" panose="02070309020205020404" pitchFamily="49" charset="0"/>
+              </a:rPr>
+              <a:t>(${filename}, 1)</a:t>
+            </a:r>
+            <a:r>
+              <a:rPr lang="en-US" dirty="0" smtClean="0"/>
+              <a:t> pairs</a:t>
+            </a:r>
+            <a:endParaRPr lang="en-US" dirty="0"/>
+          </a:p>
+        </p:txBody>
+      </p:sp>
+    </p:spTree>
+    <p:extLst>
+      <p:ext uri="{BB962C8B-B14F-4D97-AF65-F5344CB8AC3E}">
+        <p14:creationId xmlns:p14="http://schemas.microsoft.com/office/powerpoint/2010/main" val="373575402"/>
+      </p:ext>
+    </p:extLst>
+  </p:cSld>
+  <p:clrMapOvr>
+    <a:masterClrMapping/>
+  </p:clrMapOvr>
+</p:sld>
+</file>
+
+<file path=ppt/slides/slide6.xml><?xml version="1.0" encoding="utf-8"?>
+<p:sld xmlns:a="http://schemas.openxmlformats.org/drawingml/2006/main" xmlns:r="http://schemas.openxmlformats.org/officeDocument/2006/relationships" xmlns:p="http://schemas.openxmlformats.org/presentationml/2006/main">
+  <p:cSld>
+    <p:spTree>
+      <p:nvGrpSpPr>
+        <p:cNvPr id="1" name=""/>
+        <p:cNvGrpSpPr/>
+        <p:nvPr/>
+      </p:nvGrpSpPr>
+      <p:grpSpPr>
+        <a:xfrm>
+          <a:off x="0" y="0"/>
+          <a:ext cx="0" cy="0"/>
+          <a:chOff x="0" y="0"/>
+          <a:chExt cx="0" cy="0"/>
+        </a:xfrm>
+      </p:grpSpPr>
+      <p:sp>
+        <p:nvSpPr>
+          <p:cNvPr id="2" name="Title 1"/>
+          <p:cNvSpPr>
+            <a:spLocks noGrp="1"/>
+          </p:cNvSpPr>
+          <p:nvPr>
+            <p:ph type="title"/>
+          </p:nvPr>
+        </p:nvSpPr>
+        <p:spPr/>
+        <p:txBody>
+          <a:bodyPr/>
+          <a:lstStyle/>
+          <a:p>
+            <a:r>
+              <a:rPr lang="en-US" dirty="0" smtClean="0"/>
+              <a:t>Dataflow - Combine</a:t>
+            </a:r>
+            <a:endParaRPr lang="en-US" dirty="0"/>
+          </a:p>
+        </p:txBody>
+      </p:sp>
+      <p:sp>
+        <p:nvSpPr>
+          <p:cNvPr id="3" name="Content Placeholder 2"/>
+          <p:cNvSpPr>
+            <a:spLocks noGrp="1"/>
+          </p:cNvSpPr>
+          <p:nvPr>
+            <p:ph idx="1"/>
+          </p:nvPr>
+        </p:nvSpPr>
+        <p:spPr/>
+        <p:txBody>
+          <a:bodyPr/>
+          <a:lstStyle/>
+          <a:p>
+            <a:r>
+              <a:rPr lang="en-US" dirty="0" smtClean="0"/>
+              <a:t>To be explained later…</a:t>
+            </a:r>
+            <a:endParaRPr lang="en-US" dirty="0"/>
+          </a:p>
+        </p:txBody>
+      </p:sp>
+    </p:spTree>
+    <p:extLst>
+      <p:ext uri="{BB962C8B-B14F-4D97-AF65-F5344CB8AC3E}">
+        <p14:creationId xmlns:p14="http://schemas.microsoft.com/office/powerpoint/2010/main" val="3302534664"/>
+      </p:ext>
+    </p:extLst>
+  </p:cSld>
+  <p:clrMapOvr>
+    <a:masterClrMapping/>
+  </p:clrMapOvr>
+</p:sld>
+</file>
+
+<file path=ppt/slides/slide7.xml><?xml version="1.0" encoding="utf-8"?>
+<p:sld xmlns:a="http://schemas.openxmlformats.org/drawingml/2006/main" xmlns:r="http://schemas.openxmlformats.org/officeDocument/2006/relationships" xmlns:p="http://schemas.openxmlformats.org/presentationml/2006/main">
+  <p:cSld>
+    <p:spTree>
+      <p:nvGrpSpPr>
+        <p:cNvPr id="1" name=""/>
+        <p:cNvGrpSpPr/>
+        <p:nvPr/>
+      </p:nvGrpSpPr>
+      <p:grpSpPr>
+        <a:xfrm>
+          <a:off x="0" y="0"/>
+          <a:ext cx="0" cy="0"/>
+          <a:chOff x="0" y="0"/>
+          <a:chExt cx="0" cy="0"/>
+        </a:xfrm>
+      </p:grpSpPr>
+      <p:sp>
+        <p:nvSpPr>
+          <p:cNvPr id="2" name="Title 1"/>
+          <p:cNvSpPr>
+            <a:spLocks noGrp="1"/>
+          </p:cNvSpPr>
+          <p:nvPr>
+            <p:ph type="title"/>
+          </p:nvPr>
+        </p:nvSpPr>
+        <p:spPr/>
+        <p:txBody>
+          <a:bodyPr/>
+          <a:lstStyle/>
+          <a:p>
+            <a:r>
+              <a:rPr lang="en-US" dirty="0" smtClean="0"/>
+              <a:t>Dataflow - Sort</a:t>
+            </a:r>
+            <a:endParaRPr lang="en-US" dirty="0"/>
+          </a:p>
+        </p:txBody>
+      </p:sp>
+      <p:sp>
+        <p:nvSpPr>
+          <p:cNvPr id="3" name="Content Placeholder 2"/>
+          <p:cNvSpPr>
+            <a:spLocks noGrp="1"/>
+          </p:cNvSpPr>
+          <p:nvPr>
+            <p:ph idx="1"/>
+          </p:nvPr>
+        </p:nvSpPr>
+        <p:spPr/>
+        <p:txBody>
+          <a:bodyPr/>
+          <a:lstStyle/>
+          <a:p>
+            <a:r>
+              <a:rPr lang="en-US" dirty="0" smtClean="0"/>
+              <a:t>Framework provided (no coding required)</a:t>
+            </a:r>
+          </a:p>
+          <a:p>
+            <a:r>
+              <a:rPr lang="en-US" dirty="0" smtClean="0"/>
+              <a:t>Takes the Output of each Mapper on each of the Cluster nodes</a:t>
+            </a:r>
+          </a:p>
+          <a:p>
+            <a:r>
+              <a:rPr lang="en-US" dirty="0" smtClean="0"/>
+              <a:t>Designates a Key range to each Reducer</a:t>
+            </a:r>
+          </a:p>
+          <a:p>
+            <a:pPr lvl="1"/>
+            <a:r>
+              <a:rPr lang="en-US" dirty="0" smtClean="0"/>
+              <a:t>The number of Reducers is configurable. Calculated if not specified.</a:t>
+            </a:r>
+          </a:p>
+          <a:p>
+            <a:r>
+              <a:rPr lang="en-US" dirty="0" smtClean="0"/>
+              <a:t>Sorts each output Key/Value pair to the corresponding Reducer</a:t>
+            </a:r>
+          </a:p>
+          <a:p>
+            <a:endParaRPr lang="en-US" dirty="0" smtClean="0"/>
+          </a:p>
+          <a:p>
+            <a:r>
+              <a:rPr lang="en-US" dirty="0" smtClean="0"/>
+              <a:t>Example:</a:t>
+            </a:r>
+          </a:p>
+          <a:p>
+            <a:pPr lvl="1"/>
+            <a:r>
+              <a:rPr lang="en-US" dirty="0" smtClean="0">
+                <a:latin typeface="Courier New" panose="02070309020205020404" pitchFamily="49" charset="0"/>
+                <a:cs typeface="Courier New" panose="02070309020205020404" pitchFamily="49" charset="0"/>
+              </a:rPr>
+              <a:t>(‘backend.log’, [1,1,1,1,1,1])</a:t>
+            </a:r>
+          </a:p>
+          <a:p>
+            <a:pPr lvl="1"/>
+            <a:r>
+              <a:rPr lang="en-US" dirty="0" smtClean="0">
+                <a:latin typeface="Courier New" panose="02070309020205020404" pitchFamily="49" charset="0"/>
+                <a:cs typeface="Courier New" panose="02070309020205020404" pitchFamily="49" charset="0"/>
+              </a:rPr>
+              <a:t>(‘app.log’, [1,1,1])</a:t>
+            </a:r>
+          </a:p>
+        </p:txBody>
+      </p:sp>
+    </p:spTree>
+    <p:extLst>
+      <p:ext uri="{BB962C8B-B14F-4D97-AF65-F5344CB8AC3E}">
+        <p14:creationId xmlns:p14="http://schemas.microsoft.com/office/powerpoint/2010/main" val="1359229433"/>
+      </p:ext>
+    </p:extLst>
+  </p:cSld>
+  <p:clrMapOvr>
+    <a:masterClrMapping/>
+  </p:clrMapOvr>
+</p:sld>
+</file>
+
+<file path=ppt/slides/slide8.xml><?xml version="1.0" encoding="utf-8"?>
+<p:sld xmlns:a="http://schemas.openxmlformats.org/drawingml/2006/main" xmlns:r="http://schemas.openxmlformats.org/officeDocument/2006/relationships" xmlns:p="http://schemas.openxmlformats.org/presentationml/2006/main">
+  <p:cSld>
+    <p:spTree>
+      <p:nvGrpSpPr>
+        <p:cNvPr id="1" name=""/>
+        <p:cNvGrpSpPr/>
+        <p:nvPr/>
+      </p:nvGrpSpPr>
+      <p:grpSpPr>
+        <a:xfrm>
+          <a:off x="0" y="0"/>
+          <a:ext cx="0" cy="0"/>
+          <a:chOff x="0" y="0"/>
+          <a:chExt cx="0" cy="0"/>
+        </a:xfrm>
+      </p:grpSpPr>
+      <p:sp>
+        <p:nvSpPr>
+          <p:cNvPr id="2" name="Title 1"/>
+          <p:cNvSpPr>
+            <a:spLocks noGrp="1"/>
+          </p:cNvSpPr>
+          <p:nvPr>
+            <p:ph type="title"/>
+          </p:nvPr>
+        </p:nvSpPr>
+        <p:spPr/>
+        <p:txBody>
+          <a:bodyPr/>
+          <a:lstStyle/>
+          <a:p>
+            <a:r>
+              <a:rPr lang="en-US" dirty="0" smtClean="0"/>
+              <a:t>Dataflow - Reduce</a:t>
+            </a:r>
+            <a:endParaRPr lang="en-US" dirty="0"/>
+          </a:p>
+        </p:txBody>
+      </p:sp>
+      <p:sp>
+        <p:nvSpPr>
+          <p:cNvPr id="3" name="Content Placeholder 2"/>
+          <p:cNvSpPr>
+            <a:spLocks noGrp="1"/>
+          </p:cNvSpPr>
+          <p:nvPr>
+            <p:ph idx="1"/>
+          </p:nvPr>
+        </p:nvSpPr>
+        <p:spPr>
+          <a:xfrm>
+            <a:off x="677334" y="2160589"/>
+            <a:ext cx="8596668" cy="3880773"/>
+          </a:xfrm>
+        </p:spPr>
+        <p:txBody>
+          <a:bodyPr>
+            <a:normAutofit fontScale="92500" lnSpcReduction="10000"/>
+          </a:bodyPr>
+          <a:lstStyle/>
+          <a:p>
+            <a:r>
+              <a:rPr lang="en-US" dirty="0" smtClean="0"/>
+              <a:t>Optional</a:t>
+            </a:r>
+          </a:p>
+          <a:p>
+            <a:r>
+              <a:rPr lang="en-US" dirty="0" smtClean="0"/>
+              <a:t>Write a Key/Value pair as final output</a:t>
+            </a:r>
+          </a:p>
+          <a:p>
+            <a:pPr lvl="1"/>
+            <a:r>
+              <a:rPr lang="en-US" dirty="0" smtClean="0"/>
+              <a:t>Potentially different data types from Mapper Key and Value data types</a:t>
+            </a:r>
+          </a:p>
+          <a:p>
+            <a:r>
+              <a:rPr lang="en-US" dirty="0" smtClean="0"/>
+              <a:t>The objective is to process and consolidate the multiple grouped input values</a:t>
+            </a:r>
+          </a:p>
+          <a:p>
+            <a:pPr lvl="1"/>
+            <a:r>
+              <a:rPr lang="en-US" dirty="0" smtClean="0"/>
+              <a:t>Key: Output record identifier (not necessarily unique)</a:t>
+            </a:r>
+          </a:p>
+          <a:p>
+            <a:pPr lvl="1"/>
+            <a:r>
+              <a:rPr lang="en-US" dirty="0" smtClean="0"/>
+              <a:t>Value: Consolidated output of grouped input values</a:t>
+            </a:r>
+          </a:p>
+          <a:p>
+            <a:pPr lvl="1"/>
+            <a:r>
+              <a:rPr lang="en-US" dirty="0" smtClean="0"/>
+              <a:t>Can write 0 or more Key/Value pairs per input record</a:t>
+            </a:r>
+          </a:p>
+          <a:p>
+            <a:endParaRPr lang="en-US" dirty="0"/>
+          </a:p>
+          <a:p>
+            <a:r>
+              <a:rPr lang="en-US" dirty="0" smtClean="0"/>
+              <a:t>Example:</a:t>
+            </a:r>
+          </a:p>
+          <a:p>
+            <a:pPr lvl="1"/>
+            <a:r>
+              <a:rPr lang="en-US" dirty="0">
+                <a:latin typeface="Courier New" panose="02070309020205020404" pitchFamily="49" charset="0"/>
+                <a:cs typeface="Courier New" panose="02070309020205020404" pitchFamily="49" charset="0"/>
+              </a:rPr>
+              <a:t>(‘backend.log’, </a:t>
+            </a:r>
+            <a:r>
+              <a:rPr lang="en-US" dirty="0" smtClean="0">
+                <a:latin typeface="Courier New" panose="02070309020205020404" pitchFamily="49" charset="0"/>
+                <a:cs typeface="Courier New" panose="02070309020205020404" pitchFamily="49" charset="0"/>
+              </a:rPr>
+              <a:t>6)</a:t>
+            </a:r>
+            <a:endParaRPr lang="en-US" dirty="0">
+              <a:latin typeface="Courier New" panose="02070309020205020404" pitchFamily="49" charset="0"/>
+              <a:cs typeface="Courier New" panose="02070309020205020404" pitchFamily="49" charset="0"/>
+            </a:endParaRPr>
+          </a:p>
+          <a:p>
+            <a:pPr lvl="1"/>
+            <a:r>
+              <a:rPr lang="en-US" dirty="0">
+                <a:latin typeface="Courier New" panose="02070309020205020404" pitchFamily="49" charset="0"/>
+                <a:cs typeface="Courier New" panose="02070309020205020404" pitchFamily="49" charset="0"/>
+              </a:rPr>
+              <a:t>(‘app.log’, </a:t>
+            </a:r>
+            <a:r>
+              <a:rPr lang="en-US" dirty="0" smtClean="0">
+                <a:latin typeface="Courier New" panose="02070309020205020404" pitchFamily="49" charset="0"/>
+                <a:cs typeface="Courier New" panose="02070309020205020404" pitchFamily="49" charset="0"/>
+              </a:rPr>
+              <a:t>3)</a:t>
+            </a:r>
+            <a:endParaRPr lang="en-US" dirty="0">
+              <a:latin typeface="Courier New" panose="02070309020205020404" pitchFamily="49" charset="0"/>
+              <a:cs typeface="Courier New" panose="02070309020205020404" pitchFamily="49" charset="0"/>
+            </a:endParaRPr>
+          </a:p>
+          <a:p>
+            <a:pPr lvl="1"/>
+            <a:endParaRPr lang="en-US" dirty="0" smtClean="0"/>
+          </a:p>
+        </p:txBody>
+      </p:sp>
+    </p:spTree>
+    <p:extLst>
+      <p:ext uri="{BB962C8B-B14F-4D97-AF65-F5344CB8AC3E}">
+        <p14:creationId xmlns:p14="http://schemas.microsoft.com/office/powerpoint/2010/main" val="2736260329"/>
+      </p:ext>
+    </p:extLst>
+  </p:cSld>
+  <p:clrMapOvr>
+    <a:masterClrMapping/>
+  </p:clrMapOvr>
+</p:sld>
+</file>
+
+<file path=ppt/slides/slide9.xml><?xml version="1.0" encoding="utf-8"?>
+<p:sld xmlns:a="http://schemas.openxmlformats.org/drawingml/2006/main" xmlns:r="http://schemas.openxmlformats.org/officeDocument/2006/relationships" xmlns:p="http://schemas.openxmlformats.org/presentationml/2006/main">
+  <p:cSld>
+    <p:spTree>
+      <p:nvGrpSpPr>
+        <p:cNvPr id="1" name=""/>
+        <p:cNvGrpSpPr/>
+        <p:nvPr/>
+      </p:nvGrpSpPr>
+      <p:grpSpPr>
+        <a:xfrm>
+          <a:off x="0" y="0"/>
+          <a:ext cx="0" cy="0"/>
+          <a:chOff x="0" y="0"/>
+          <a:chExt cx="0" cy="0"/>
+        </a:xfrm>
+      </p:grpSpPr>
+      <p:sp>
+        <p:nvSpPr>
+          <p:cNvPr id="2" name="Title 1"/>
+          <p:cNvSpPr>
+            <a:spLocks noGrp="1"/>
+          </p:cNvSpPr>
+          <p:nvPr>
+            <p:ph type="title"/>
+          </p:nvPr>
+        </p:nvSpPr>
+        <p:spPr/>
+        <p:txBody>
+          <a:bodyPr/>
+          <a:lstStyle/>
+          <a:p>
+            <a:r>
+              <a:rPr lang="en-US" dirty="0" smtClean="0"/>
+              <a:t>Dataflow - Combine</a:t>
+            </a:r>
+            <a:endParaRPr lang="en-US" dirty="0"/>
+          </a:p>
+        </p:txBody>
+      </p:sp>
+      <p:sp>
+        <p:nvSpPr>
+          <p:cNvPr id="3" name="Content Placeholder 2"/>
+          <p:cNvSpPr>
+            <a:spLocks noGrp="1"/>
+          </p:cNvSpPr>
+          <p:nvPr>
+            <p:ph idx="1"/>
+          </p:nvPr>
+        </p:nvSpPr>
+        <p:spPr/>
+        <p:txBody>
+          <a:bodyPr/>
+          <a:lstStyle/>
+          <a:p>
+            <a:r>
+              <a:rPr lang="en-US" dirty="0" smtClean="0"/>
+              <a:t>Optional</a:t>
+            </a:r>
+          </a:p>
+          <a:p>
+            <a:r>
+              <a:rPr lang="en-US" dirty="0" smtClean="0"/>
+              <a:t>Reducer that runs locally after the Mapper has finished executing</a:t>
+            </a:r>
+          </a:p>
+          <a:p>
+            <a:endParaRPr lang="en-US" dirty="0" smtClean="0"/>
+          </a:p>
+          <a:p>
+            <a:r>
+              <a:rPr lang="en-US" dirty="0" smtClean="0"/>
+              <a:t>Example:</a:t>
+            </a:r>
+          </a:p>
+          <a:p>
+            <a:pPr lvl="1"/>
+            <a:r>
+              <a:rPr lang="en-US" dirty="0" smtClean="0"/>
+              <a:t>Mapper output @ Node #1: </a:t>
+            </a:r>
+            <a:r>
+              <a:rPr lang="en-US" dirty="0">
+                <a:latin typeface="Courier New" panose="02070309020205020404" pitchFamily="49" charset="0"/>
+                <a:cs typeface="Courier New" panose="02070309020205020404" pitchFamily="49" charset="0"/>
+              </a:rPr>
+              <a:t>(‘backend.log’, [</a:t>
+            </a:r>
+            <a:r>
+              <a:rPr lang="en-US" dirty="0" smtClean="0">
+                <a:latin typeface="Courier New" panose="02070309020205020404" pitchFamily="49" charset="0"/>
+                <a:cs typeface="Courier New" panose="02070309020205020404" pitchFamily="49" charset="0"/>
+              </a:rPr>
+              <a:t>1,1,1,1])</a:t>
+            </a:r>
+            <a:r>
+              <a:rPr lang="en-US" dirty="0" smtClean="0"/>
+              <a:t> </a:t>
+            </a:r>
+          </a:p>
+          <a:p>
+            <a:pPr lvl="2"/>
+            <a:r>
+              <a:rPr lang="en-US" dirty="0" smtClean="0"/>
+              <a:t>Combines into </a:t>
+            </a:r>
+            <a:r>
+              <a:rPr lang="en-US" dirty="0">
+                <a:latin typeface="Courier New" panose="02070309020205020404" pitchFamily="49" charset="0"/>
+                <a:cs typeface="Courier New" panose="02070309020205020404" pitchFamily="49" charset="0"/>
+              </a:rPr>
+              <a:t>(‘backend.log’, </a:t>
+            </a:r>
+            <a:r>
+              <a:rPr lang="en-US" dirty="0" smtClean="0">
+                <a:latin typeface="Courier New" panose="02070309020205020404" pitchFamily="49" charset="0"/>
+                <a:cs typeface="Courier New" panose="02070309020205020404" pitchFamily="49" charset="0"/>
+              </a:rPr>
+              <a:t>[4])</a:t>
+            </a:r>
+            <a:endParaRPr lang="en-US" dirty="0" smtClean="0"/>
+          </a:p>
+          <a:p>
+            <a:pPr lvl="1"/>
+            <a:r>
+              <a:rPr lang="en-US" dirty="0" smtClean="0"/>
+              <a:t>Mapper output @ Node #2</a:t>
+            </a:r>
+            <a:r>
+              <a:rPr lang="en-US" dirty="0"/>
+              <a:t>: </a:t>
+            </a:r>
+            <a:r>
+              <a:rPr lang="en-US" dirty="0">
+                <a:latin typeface="Courier New" panose="02070309020205020404" pitchFamily="49" charset="0"/>
+                <a:cs typeface="Courier New" panose="02070309020205020404" pitchFamily="49" charset="0"/>
+              </a:rPr>
+              <a:t>(‘backend.log’, [1,1])</a:t>
+            </a:r>
+            <a:r>
+              <a:rPr lang="en-US" dirty="0"/>
+              <a:t> </a:t>
+            </a:r>
+            <a:endParaRPr lang="en-US" dirty="0" smtClean="0"/>
+          </a:p>
+          <a:p>
+            <a:pPr lvl="2"/>
+            <a:r>
+              <a:rPr lang="en-US" dirty="0" smtClean="0"/>
+              <a:t>Combines into </a:t>
+            </a:r>
+            <a:r>
+              <a:rPr lang="en-US" dirty="0">
+                <a:latin typeface="Courier New" panose="02070309020205020404" pitchFamily="49" charset="0"/>
+                <a:cs typeface="Courier New" panose="02070309020205020404" pitchFamily="49" charset="0"/>
+              </a:rPr>
+              <a:t>(‘backend.log’, [2])</a:t>
+            </a:r>
+            <a:endParaRPr lang="en-US" dirty="0"/>
+          </a:p>
+          <a:p>
+            <a:pPr lvl="1"/>
+            <a:r>
+              <a:rPr lang="en-US" dirty="0" smtClean="0"/>
+              <a:t>Sort produces </a:t>
+            </a:r>
+            <a:r>
+              <a:rPr lang="en-US" dirty="0">
+                <a:latin typeface="Courier New" panose="02070309020205020404" pitchFamily="49" charset="0"/>
+                <a:cs typeface="Courier New" panose="02070309020205020404" pitchFamily="49" charset="0"/>
+              </a:rPr>
+              <a:t>(‘backend.log’, </a:t>
+            </a:r>
+            <a:r>
+              <a:rPr lang="en-US" dirty="0" smtClean="0">
+                <a:latin typeface="Courier New" panose="02070309020205020404" pitchFamily="49" charset="0"/>
+                <a:cs typeface="Courier New" panose="02070309020205020404" pitchFamily="49" charset="0"/>
+              </a:rPr>
+              <a:t>[4,2</a:t>
+            </a:r>
+            <a:r>
+              <a:rPr lang="en-US" dirty="0">
+                <a:latin typeface="Courier New" panose="02070309020205020404" pitchFamily="49" charset="0"/>
+                <a:cs typeface="Courier New" panose="02070309020205020404" pitchFamily="49" charset="0"/>
+              </a:rPr>
+              <a:t>])</a:t>
+            </a:r>
+            <a:endParaRPr lang="en-US" dirty="0" smtClean="0"/>
+          </a:p>
+          <a:p>
+            <a:pPr lvl="1"/>
+            <a:r>
+              <a:rPr lang="en-US" dirty="0" smtClean="0"/>
+              <a:t>Reducer outputs </a:t>
+            </a:r>
+            <a:r>
+              <a:rPr lang="en-US" dirty="0">
+                <a:latin typeface="Courier New" panose="02070309020205020404" pitchFamily="49" charset="0"/>
+                <a:cs typeface="Courier New" panose="02070309020205020404" pitchFamily="49" charset="0"/>
+              </a:rPr>
+              <a:t>(‘backend.log’, </a:t>
+            </a:r>
+            <a:r>
+              <a:rPr lang="en-US" dirty="0" smtClean="0">
+                <a:latin typeface="Courier New" panose="02070309020205020404" pitchFamily="49" charset="0"/>
+                <a:cs typeface="Courier New" panose="02070309020205020404" pitchFamily="49" charset="0"/>
+              </a:rPr>
+              <a:t>6)</a:t>
+            </a:r>
+            <a:endParaRPr lang="en-US" dirty="0" smtClean="0"/>
+          </a:p>
+        </p:txBody>
+      </p:sp>
+    </p:spTree>
+    <p:extLst>
+      <p:ext uri="{BB962C8B-B14F-4D97-AF65-F5344CB8AC3E}">
+        <p14:creationId xmlns:p14="http://schemas.microsoft.com/office/powerpoint/2010/main" val="1219726399"/>
       </p:ext>
     </p:extLst>
   </p:cSld>

</xml_diff>

<commit_message>
Updated PPT references. All set!
</commit_message>
<xml_diff>
--- a/2013-09/hadoop-map-reduce/MapReduce.pptx
+++ b/2013-09/hadoop-map-reduce/MapReduce.pptx
@@ -26,6 +26,7 @@
     <p:sldId id="275" r:id="rId20"/>
     <p:sldId id="276" r:id="rId21"/>
     <p:sldId id="259" r:id="rId22"/>
+    <p:sldId id="277" r:id="rId23"/>
   </p:sldIdLst>
   <p:sldSz cx="12192000" cy="6858000"/>
   <p:notesSz cx="6858000" cy="9144000"/>
@@ -878,7 +879,7 @@
             <a:fld id="{B61BEF0D-F0BB-DE4B-95CE-6DB70DBA9567}" type="datetimeFigureOut">
               <a:rPr lang="en-US" dirty="0"/>
               <a:pPr/>
-              <a:t>9/26/2013</a:t>
+              <a:t>9/27/2013</a:t>
             </a:fld>
             <a:endParaRPr lang="en-US" dirty="0"/>
           </a:p>
@@ -1126,7 +1127,7 @@
             <a:fld id="{B61BEF0D-F0BB-DE4B-95CE-6DB70DBA9567}" type="datetimeFigureOut">
               <a:rPr lang="en-US" dirty="0"/>
               <a:pPr/>
-              <a:t>9/26/2013</a:t>
+              <a:t>9/27/2013</a:t>
             </a:fld>
             <a:endParaRPr lang="en-US" dirty="0"/>
           </a:p>
@@ -1437,7 +1438,7 @@
             <a:fld id="{B61BEF0D-F0BB-DE4B-95CE-6DB70DBA9567}" type="datetimeFigureOut">
               <a:rPr lang="en-US" dirty="0"/>
               <a:pPr/>
-              <a:t>9/26/2013</a:t>
+              <a:t>9/27/2013</a:t>
             </a:fld>
             <a:endParaRPr lang="en-US" dirty="0"/>
           </a:p>
@@ -1767,7 +1768,7 @@
             <a:fld id="{B61BEF0D-F0BB-DE4B-95CE-6DB70DBA9567}" type="datetimeFigureOut">
               <a:rPr lang="en-US" dirty="0"/>
               <a:pPr/>
-              <a:t>9/26/2013</a:t>
+              <a:t>9/27/2013</a:t>
             </a:fld>
             <a:endParaRPr lang="en-US" dirty="0"/>
           </a:p>
@@ -2078,7 +2079,7 @@
             <a:fld id="{B61BEF0D-F0BB-DE4B-95CE-6DB70DBA9567}" type="datetimeFigureOut">
               <a:rPr lang="en-US" dirty="0"/>
               <a:pPr/>
-              <a:t>9/26/2013</a:t>
+              <a:t>9/27/2013</a:t>
             </a:fld>
             <a:endParaRPr lang="en-US" dirty="0"/>
           </a:p>
@@ -2468,7 +2469,7 @@
             <a:fld id="{B61BEF0D-F0BB-DE4B-95CE-6DB70DBA9567}" type="datetimeFigureOut">
               <a:rPr lang="en-US" dirty="0"/>
               <a:pPr/>
-              <a:t>9/26/2013</a:t>
+              <a:t>9/27/2013</a:t>
             </a:fld>
             <a:endParaRPr lang="en-US" dirty="0"/>
           </a:p>
@@ -2634,7 +2635,7 @@
           <a:p>
             <a:fld id="{55C6B4A9-1611-4792-9094-5F34BCA07E0B}" type="datetimeFigureOut">
               <a:rPr lang="en-US" dirty="0"/>
-              <a:t>9/26/2013</a:t>
+              <a:t>9/27/2013</a:t>
             </a:fld>
             <a:endParaRPr lang="en-US" dirty="0"/>
           </a:p>
@@ -2810,7 +2811,7 @@
             <a:fld id="{B61BEF0D-F0BB-DE4B-95CE-6DB70DBA9567}" type="datetimeFigureOut">
               <a:rPr lang="en-US" dirty="0"/>
               <a:pPr/>
-              <a:t>9/26/2013</a:t>
+              <a:t>9/27/2013</a:t>
             </a:fld>
             <a:endParaRPr lang="en-US" dirty="0"/>
           </a:p>
@@ -2976,7 +2977,7 @@
           <a:p>
             <a:fld id="{42A54C80-263E-416B-A8E0-580EDEADCBDC}" type="datetimeFigureOut">
               <a:rPr lang="en-US" dirty="0"/>
-              <a:t>9/26/2013</a:t>
+              <a:t>9/27/2013</a:t>
             </a:fld>
             <a:endParaRPr lang="en-US" dirty="0"/>
           </a:p>
@@ -3219,7 +3220,7 @@
             <a:fld id="{B61BEF0D-F0BB-DE4B-95CE-6DB70DBA9567}" type="datetimeFigureOut">
               <a:rPr lang="en-US" dirty="0"/>
               <a:pPr/>
-              <a:t>9/26/2013</a:t>
+              <a:t>9/27/2013</a:t>
             </a:fld>
             <a:endParaRPr lang="en-US" dirty="0"/>
           </a:p>
@@ -3447,7 +3448,7 @@
           <a:p>
             <a:fld id="{42A54C80-263E-416B-A8E0-580EDEADCBDC}" type="datetimeFigureOut">
               <a:rPr lang="en-US" dirty="0"/>
-              <a:t>9/26/2013</a:t>
+              <a:t>9/27/2013</a:t>
             </a:fld>
             <a:endParaRPr lang="en-US" dirty="0"/>
           </a:p>
@@ -3817,7 +3818,7 @@
             <a:fld id="{B61BEF0D-F0BB-DE4B-95CE-6DB70DBA9567}" type="datetimeFigureOut">
               <a:rPr lang="en-US" dirty="0"/>
               <a:pPr/>
-              <a:t>9/26/2013</a:t>
+              <a:t>9/27/2013</a:t>
             </a:fld>
             <a:endParaRPr lang="en-US" dirty="0"/>
           </a:p>
@@ -3937,7 +3938,7 @@
             <a:fld id="{B61BEF0D-F0BB-DE4B-95CE-6DB70DBA9567}" type="datetimeFigureOut">
               <a:rPr lang="en-US" dirty="0"/>
               <a:pPr/>
-              <a:t>9/26/2013</a:t>
+              <a:t>9/27/2013</a:t>
             </a:fld>
             <a:endParaRPr lang="en-US" dirty="0"/>
           </a:p>
@@ -4029,7 +4030,7 @@
             <a:fld id="{B61BEF0D-F0BB-DE4B-95CE-6DB70DBA9567}" type="datetimeFigureOut">
               <a:rPr lang="en-US" dirty="0"/>
               <a:pPr/>
-              <a:t>9/26/2013</a:t>
+              <a:t>9/27/2013</a:t>
             </a:fld>
             <a:endParaRPr lang="en-US" dirty="0"/>
           </a:p>
@@ -4280,7 +4281,7 @@
           <a:p>
             <a:fld id="{42A54C80-263E-416B-A8E0-580EDEADCBDC}" type="datetimeFigureOut">
               <a:rPr lang="en-US" dirty="0"/>
-              <a:t>9/26/2013</a:t>
+              <a:t>9/27/2013</a:t>
             </a:fld>
             <a:endParaRPr lang="en-US" dirty="0"/>
           </a:p>
@@ -4582,7 +4583,7 @@
             <a:fld id="{B61BEF0D-F0BB-DE4B-95CE-6DB70DBA9567}" type="datetimeFigureOut">
               <a:rPr lang="en-US" dirty="0"/>
               <a:pPr/>
-              <a:t>9/26/2013</a:t>
+              <a:t>9/27/2013</a:t>
             </a:fld>
             <a:endParaRPr lang="en-US" dirty="0"/>
           </a:p>
@@ -5280,7 +5281,7 @@
             <a:fld id="{B61BEF0D-F0BB-DE4B-95CE-6DB70DBA9567}" type="datetimeFigureOut">
               <a:rPr lang="en-US" dirty="0"/>
               <a:pPr/>
-              <a:t>9/26/2013</a:t>
+              <a:t>9/27/2013</a:t>
             </a:fld>
             <a:endParaRPr lang="en-US" dirty="0"/>
           </a:p>
@@ -7208,6 +7209,84 @@
           <a:p>
             <a:r>
               <a:rPr lang="en-US" dirty="0" smtClean="0"/>
+              <a:t>Source Code and Documents</a:t>
+            </a:r>
+            <a:endParaRPr lang="en-US" dirty="0"/>
+          </a:p>
+        </p:txBody>
+      </p:sp>
+      <p:sp>
+        <p:nvSpPr>
+          <p:cNvPr id="3" name="Content Placeholder 2"/>
+          <p:cNvSpPr>
+            <a:spLocks noGrp="1"/>
+          </p:cNvSpPr>
+          <p:nvPr>
+            <p:ph idx="1"/>
+          </p:nvPr>
+        </p:nvSpPr>
+        <p:spPr/>
+        <p:txBody>
+          <a:bodyPr/>
+          <a:lstStyle/>
+          <a:p>
+            <a:r>
+              <a:rPr lang="en-US" dirty="0">
+                <a:hlinkClick r:id="rId2"/>
+              </a:rPr>
+              <a:t>https://github.com/prosoft-nearshore/blog/tree/master/2013-09/hadoop-map-reduce</a:t>
+            </a:r>
+            <a:endParaRPr lang="en-US" dirty="0"/>
+          </a:p>
+        </p:txBody>
+      </p:sp>
+    </p:spTree>
+    <p:extLst>
+      <p:ext uri="{BB962C8B-B14F-4D97-AF65-F5344CB8AC3E}">
+        <p14:creationId xmlns:p14="http://schemas.microsoft.com/office/powerpoint/2010/main" val="3958380108"/>
+      </p:ext>
+    </p:extLst>
+  </p:cSld>
+  <p:clrMapOvr>
+    <a:masterClrMapping/>
+  </p:clrMapOvr>
+</p:sld>
+</file>
+
+<file path=ppt/slides/slide22.xml><?xml version="1.0" encoding="utf-8"?>
+<p:sld xmlns:a="http://schemas.openxmlformats.org/drawingml/2006/main" xmlns:r="http://schemas.openxmlformats.org/officeDocument/2006/relationships" xmlns:p="http://schemas.openxmlformats.org/presentationml/2006/main">
+  <p:cSld>
+    <p:spTree>
+      <p:nvGrpSpPr>
+        <p:cNvPr id="1" name=""/>
+        <p:cNvGrpSpPr/>
+        <p:nvPr/>
+      </p:nvGrpSpPr>
+      <p:grpSpPr>
+        <a:xfrm>
+          <a:off x="0" y="0"/>
+          <a:ext cx="0" cy="0"/>
+          <a:chOff x="0" y="0"/>
+          <a:chExt cx="0" cy="0"/>
+        </a:xfrm>
+      </p:grpSpPr>
+      <p:sp>
+        <p:nvSpPr>
+          <p:cNvPr id="2" name="Title 1"/>
+          <p:cNvSpPr>
+            <a:spLocks noGrp="1"/>
+          </p:cNvSpPr>
+          <p:nvPr>
+            <p:ph type="title"/>
+          </p:nvPr>
+        </p:nvSpPr>
+        <p:spPr/>
+        <p:txBody>
+          <a:bodyPr/>
+          <a:lstStyle/>
+          <a:p>
+            <a:r>
+              <a:rPr lang="en-US" dirty="0" smtClean="0"/>
               <a:t>References</a:t>
             </a:r>
             <a:endParaRPr lang="en-US" dirty="0"/>
@@ -7289,7 +7368,7 @@
     </p:spTree>
     <p:extLst>
       <p:ext uri="{BB962C8B-B14F-4D97-AF65-F5344CB8AC3E}">
-        <p14:creationId xmlns:p14="http://schemas.microsoft.com/office/powerpoint/2010/main" val="3958380108"/>
+        <p14:creationId xmlns:p14="http://schemas.microsoft.com/office/powerpoint/2010/main" val="4075726005"/>
       </p:ext>
     </p:extLst>
   </p:cSld>

</xml_diff>